<commit_message>
wrote more on PPT and readme
</commit_message>
<xml_diff>
--- a/Documentation/MP_poster.pptx
+++ b/Documentation/MP_poster.pptx
@@ -3938,7 +3938,7 @@
         </p:nvSpPr>
         <p:spPr>
           <a:xfrm>
-            <a:off x="685800" y="1734041"/>
+            <a:off x="665822" y="3204801"/>
             <a:ext cx="10668000" cy="3200876"/>
           </a:xfrm>
           <a:prstGeom prst="rect">
@@ -3959,7 +3959,7 @@
           <a:p>
             <a:r>
               <a:rPr lang="en-US" sz="4000" dirty="0"/>
-              <a:t>Overview: </a:t>
+              <a:t>Overview</a:t>
             </a:r>
           </a:p>
           <a:p>
@@ -3978,7 +3978,7 @@
         </p:nvSpPr>
         <p:spPr bwMode="auto">
           <a:xfrm>
-            <a:off x="1812764" y="12599344"/>
+            <a:off x="1440397" y="13574417"/>
             <a:ext cx="721934" cy="688296"/>
           </a:xfrm>
           <a:prstGeom prst="downArrow">
@@ -4043,7 +4043,7 @@
         </p:nvSpPr>
         <p:spPr>
           <a:xfrm>
-            <a:off x="1056555" y="11479886"/>
+            <a:off x="485631" y="12698253"/>
             <a:ext cx="2374947" cy="830997"/>
           </a:xfrm>
           <a:prstGeom prst="rect">
@@ -4072,7 +4072,7 @@
         </p:nvSpPr>
         <p:spPr>
           <a:xfrm>
-            <a:off x="1272094" y="13411482"/>
+            <a:off x="780429" y="14360217"/>
             <a:ext cx="1957215" cy="830997"/>
           </a:xfrm>
           <a:prstGeom prst="rect">
@@ -4101,7 +4101,7 @@
         </p:nvSpPr>
         <p:spPr>
           <a:xfrm>
-            <a:off x="3355481" y="15912168"/>
+            <a:off x="2760659" y="16694677"/>
             <a:ext cx="1747260" cy="830997"/>
           </a:xfrm>
           <a:prstGeom prst="rect">
@@ -4130,7 +4130,7 @@
         </p:nvSpPr>
         <p:spPr>
           <a:xfrm>
-            <a:off x="1515618" y="16728060"/>
+            <a:off x="939853" y="17345071"/>
             <a:ext cx="2256984" cy="830997"/>
           </a:xfrm>
           <a:prstGeom prst="rect">
@@ -4159,7 +4159,7 @@
         </p:nvSpPr>
         <p:spPr>
           <a:xfrm>
-            <a:off x="824798" y="18632402"/>
+            <a:off x="452432" y="19414912"/>
             <a:ext cx="3764735" cy="1569660"/>
           </a:xfrm>
           <a:prstGeom prst="rect">
@@ -4188,7 +4188,7 @@
         </p:nvSpPr>
         <p:spPr>
           <a:xfrm>
-            <a:off x="5497964" y="19024944"/>
+            <a:off x="5125598" y="19807454"/>
             <a:ext cx="3383129" cy="830997"/>
           </a:xfrm>
           <a:prstGeom prst="rect">
@@ -4217,8 +4217,8 @@
         </p:nvSpPr>
         <p:spPr>
           <a:xfrm>
-            <a:off x="5563607" y="15709624"/>
-            <a:ext cx="3950120" cy="1569660"/>
+            <a:off x="4885799" y="16655393"/>
+            <a:ext cx="3317486" cy="1323439"/>
           </a:xfrm>
           <a:prstGeom prst="rect">
             <a:avLst/>
@@ -4232,7 +4232,7 @@
           <a:lstStyle/>
           <a:p>
             <a:r>
-              <a:rPr lang="en-US" sz="4800" dirty="0"/>
+              <a:rPr lang="en-US" sz="4000" dirty="0"/>
               <a:t>Shift Registers</a:t>
             </a:r>
           </a:p>
@@ -4246,8 +4246,8 @@
         </p:nvSpPr>
         <p:spPr>
           <a:xfrm>
-            <a:off x="9973501" y="15731418"/>
-            <a:ext cx="4349650" cy="1569660"/>
+            <a:off x="7974801" y="16481241"/>
+            <a:ext cx="4349650" cy="1323439"/>
           </a:xfrm>
           <a:prstGeom prst="rect">
             <a:avLst/>
@@ -4261,7 +4261,7 @@
           <a:lstStyle/>
           <a:p>
             <a:r>
-              <a:rPr lang="en-US" sz="4800" dirty="0"/>
+              <a:rPr lang="en-US" sz="4000" dirty="0"/>
               <a:t>7 Segment Displays</a:t>
             </a:r>
           </a:p>
@@ -4275,8 +4275,8 @@
         </p:nvSpPr>
         <p:spPr bwMode="auto">
           <a:xfrm>
-            <a:off x="685800" y="13411200"/>
-            <a:ext cx="4214748" cy="4147857"/>
+            <a:off x="313433" y="14330631"/>
+            <a:ext cx="4145773" cy="3752958"/>
           </a:xfrm>
           <a:prstGeom prst="rect">
             <a:avLst/>
@@ -4340,7 +4340,7 @@
         </p:nvSpPr>
         <p:spPr>
           <a:xfrm>
-            <a:off x="824798" y="15731418"/>
+            <a:off x="536114" y="15933393"/>
             <a:ext cx="2052132" cy="830997"/>
           </a:xfrm>
           <a:prstGeom prst="rect">
@@ -4369,7 +4369,7 @@
         </p:nvSpPr>
         <p:spPr>
           <a:xfrm>
-            <a:off x="11574916" y="1969846"/>
+            <a:off x="11704632" y="3449960"/>
             <a:ext cx="9768568" cy="1754326"/>
           </a:xfrm>
           <a:prstGeom prst="rect">
@@ -4403,7 +4403,7 @@
         </p:nvSpPr>
         <p:spPr>
           <a:xfrm>
-            <a:off x="3032750" y="13861279"/>
+            <a:off x="2533264" y="14562876"/>
             <a:ext cx="2069991" cy="738664"/>
           </a:xfrm>
           <a:prstGeom prst="rect">
@@ -4419,7 +4419,7 @@
           <a:p>
             <a:r>
               <a:rPr lang="en-US" sz="4200" dirty="0"/>
-              <a:t>GPIO</a:t>
+              <a:t>PWM</a:t>
             </a:r>
           </a:p>
         </p:txBody>
@@ -4432,7 +4432,7 @@
         </p:nvSpPr>
         <p:spPr>
           <a:xfrm>
-            <a:off x="6315966" y="13519204"/>
+            <a:off x="5131862" y="14413225"/>
             <a:ext cx="4750701" cy="1446550"/>
           </a:xfrm>
           <a:prstGeom prst="rect">
@@ -4468,8 +4468,8 @@
         </p:nvSpPr>
         <p:spPr>
           <a:xfrm>
-            <a:off x="21655043" y="7210628"/>
-            <a:ext cx="9997168" cy="4708981"/>
+            <a:off x="670220" y="6804809"/>
+            <a:ext cx="10663602" cy="4708981"/>
           </a:xfrm>
           <a:prstGeom prst="rect">
             <a:avLst/>
@@ -4495,7 +4495,7 @@
           <a:p>
             <a:r>
               <a:rPr lang="en-US" sz="4000" dirty="0"/>
-              <a:t>This project uses the ATD to receive a PWM signal from the LIDAR, a TIM module to control LED refresh rates, serial communication, and the SPI module to drive 7-segments through a shift register.</a:t>
+              <a:t>This project uses the ATD to receive a PWM signal from the LIDAR, the TIM module to control LED refresh rates and LIDAR sampling, the SCI to communicate with the car, and the SPI module to drive 7-segments through a shift register.</a:t>
             </a:r>
             <a:endParaRPr lang="en-US" sz="4000" dirty="0"/>
           </a:p>
@@ -4509,7 +4509,7 @@
         </p:nvSpPr>
         <p:spPr bwMode="auto">
           <a:xfrm rot="16200000">
-            <a:off x="5274528" y="13829099"/>
+            <a:off x="4614872" y="14640924"/>
             <a:ext cx="721934" cy="688296"/>
           </a:xfrm>
           <a:prstGeom prst="downArrow">
@@ -4574,7 +4574,7 @@
         </p:nvSpPr>
         <p:spPr bwMode="auto">
           <a:xfrm rot="16200000">
-            <a:off x="5087014" y="15983518"/>
+            <a:off x="4656676" y="16766027"/>
             <a:ext cx="721934" cy="688296"/>
           </a:xfrm>
           <a:prstGeom prst="downArrow">
@@ -4639,7 +4639,7 @@
         </p:nvSpPr>
         <p:spPr bwMode="auto">
           <a:xfrm rot="16200000">
-            <a:off x="9412705" y="15945824"/>
+            <a:off x="7957983" y="16766027"/>
             <a:ext cx="721934" cy="688296"/>
           </a:xfrm>
           <a:prstGeom prst="downArrow">
@@ -4704,7 +4704,7 @@
         </p:nvSpPr>
         <p:spPr bwMode="auto">
           <a:xfrm>
-            <a:off x="1530540" y="17888775"/>
+            <a:off x="981167" y="18581583"/>
             <a:ext cx="721934" cy="688296"/>
           </a:xfrm>
           <a:prstGeom prst="downArrow">
@@ -4769,7 +4769,7 @@
         </p:nvSpPr>
         <p:spPr bwMode="auto">
           <a:xfrm rot="10800000">
-            <a:off x="3070535" y="17849124"/>
+            <a:off x="2068345" y="18466135"/>
             <a:ext cx="721934" cy="688296"/>
           </a:xfrm>
           <a:prstGeom prst="downArrow">
@@ -4834,7 +4834,7 @@
         </p:nvSpPr>
         <p:spPr bwMode="auto">
           <a:xfrm rot="16200000">
-            <a:off x="4771404" y="19511793"/>
+            <a:off x="4399038" y="20294303"/>
             <a:ext cx="721934" cy="688296"/>
           </a:xfrm>
           <a:prstGeom prst="downArrow">
@@ -4913,17 +4913,375 @@
         </p:blipFill>
         <p:spPr>
           <a:xfrm>
-            <a:off x="11574916" y="4658714"/>
-            <a:ext cx="7125694" cy="7716327"/>
+            <a:off x="17025146" y="10645616"/>
+            <a:ext cx="3536038" cy="3829132"/>
           </a:xfrm>
           <a:prstGeom prst="rect">
             <a:avLst/>
           </a:prstGeom>
         </p:spPr>
       </p:pic>
+      <p:sp>
+        <p:nvSpPr>
+          <p:cNvPr id="39" name="Down Arrow 2"/>
+          <p:cNvSpPr/>
+          <p:nvPr/>
+        </p:nvSpPr>
+        <p:spPr bwMode="auto">
+          <a:xfrm rot="5400000">
+            <a:off x="4263848" y="19349504"/>
+            <a:ext cx="721934" cy="688296"/>
+          </a:xfrm>
+          <a:prstGeom prst="downArrow">
+            <a:avLst/>
+          </a:prstGeom>
+          <a:solidFill>
+            <a:schemeClr val="tx1"/>
+          </a:solidFill>
+          <a:ln w="9525" cap="flat" cmpd="sng" algn="ctr">
+            <a:noFill/>
+            <a:prstDash val="solid"/>
+            <a:round/>
+            <a:headEnd type="none" w="med" len="med"/>
+            <a:tailEnd type="none" w="med" len="med"/>
+          </a:ln>
+          <a:effectLst/>
+        </p:spPr>
+        <p:txBody>
+          <a:bodyPr vert="horz" wrap="square" lIns="91440" tIns="45720" rIns="91440" bIns="45720" numCol="1" rtlCol="0" anchor="t" anchorCtr="0" compatLnSpc="1">
+            <a:prstTxWarp prst="textNoShape">
+              <a:avLst/>
+            </a:prstTxWarp>
+            <a:spAutoFit/>
+          </a:bodyPr>
+          <a:lstStyle/>
+          <a:p>
+            <a:pPr marL="0" marR="0" indent="0" algn="ctr" defTabSz="3135313" rtl="0" eaLnBrk="1" fontAlgn="base" latinLnBrk="0" hangingPunct="1">
+              <a:lnSpc>
+                <a:spcPct val="100000"/>
+              </a:lnSpc>
+              <a:spcBef>
+                <a:spcPct val="50000"/>
+              </a:spcBef>
+              <a:spcAft>
+                <a:spcPct val="0"/>
+              </a:spcAft>
+              <a:buClrTx/>
+              <a:buSzTx/>
+              <a:buFontTx/>
+              <a:buNone/>
+              <a:tabLst/>
+            </a:pPr>
+            <a:endParaRPr kumimoji="0" lang="en-US" sz="3800" b="1" i="0" u="none" strike="noStrike" cap="none" normalizeH="0" baseline="0">
+              <a:ln>
+                <a:noFill/>
+              </a:ln>
+              <a:solidFill>
+                <a:schemeClr val="tx1"/>
+              </a:solidFill>
+              <a:effectLst/>
+              <a:latin typeface="Arial" charset="0"/>
+              <a:cs typeface="Arial" charset="0"/>
+            </a:endParaRPr>
+          </a:p>
+        </p:txBody>
+      </p:sp>
+      <p:sp>
+        <p:nvSpPr>
+          <p:cNvPr id="27" name="TextBox 26"/>
+          <p:cNvSpPr txBox="1"/>
+          <p:nvPr/>
+        </p:nvSpPr>
+        <p:spPr>
+          <a:xfrm>
+            <a:off x="21849422" y="3204801"/>
+            <a:ext cx="10668000" cy="7078861"/>
+          </a:xfrm>
+          <a:prstGeom prst="rect">
+            <a:avLst/>
+          </a:prstGeom>
+          <a:noFill/>
+          <a:ln>
+            <a:solidFill>
+              <a:schemeClr val="tx1"/>
+            </a:solidFill>
+          </a:ln>
+        </p:spPr>
+        <p:txBody>
+          <a:bodyPr wrap="square" rtlCol="0">
+            <a:spAutoFit/>
+          </a:bodyPr>
+          <a:lstStyle/>
+          <a:p>
+            <a:r>
+              <a:rPr lang="en-US" sz="4000" dirty="0"/>
+              <a:t>Implementation</a:t>
+            </a:r>
+          </a:p>
+          <a:p>
+            <a:r>
+              <a:rPr lang="en-US" sz="3600" dirty="0"/>
+              <a:t>This project obtains its speed measurement by continuously polling a speed reading via SCI from the Engine Control Unit (ECU) of a car through the OBD port. Distance measurements are obtained by triggering a distance measurement on the LIDAR and then reading the value the LIDAR responds with using and ATD to calculate how long the pulse is and converting that to a distance. These inputs are then shifted out via SPI to external shift registers which drive 7-segment LEDs.</a:t>
+            </a:r>
+          </a:p>
+        </p:txBody>
+      </p:sp>
+      <p:sp>
+        <p:nvSpPr>
+          <p:cNvPr id="2048" name="TextBox 2047"/>
+          <p:cNvSpPr txBox="1"/>
+          <p:nvPr/>
+        </p:nvSpPr>
+        <p:spPr>
+          <a:xfrm>
+            <a:off x="4551839" y="21239917"/>
+            <a:ext cx="3534084" cy="677108"/>
+          </a:xfrm>
+          <a:prstGeom prst="rect">
+            <a:avLst/>
+          </a:prstGeom>
+          <a:noFill/>
+        </p:spPr>
+        <p:txBody>
+          <a:bodyPr wrap="square" rtlCol="0">
+            <a:spAutoFit/>
+          </a:bodyPr>
+          <a:lstStyle/>
+          <a:p>
+            <a:r>
+              <a:rPr lang="en-US" dirty="0"/>
+              <a:t>Power</a:t>
+            </a:r>
+          </a:p>
+        </p:txBody>
+      </p:sp>
+      <p:sp>
+        <p:nvSpPr>
+          <p:cNvPr id="43" name="Down Arrow 2"/>
+          <p:cNvSpPr/>
+          <p:nvPr/>
+        </p:nvSpPr>
+        <p:spPr bwMode="auto">
+          <a:xfrm>
+            <a:off x="6012584" y="20551621"/>
+            <a:ext cx="448500" cy="688296"/>
+          </a:xfrm>
+          <a:prstGeom prst="downArrow">
+            <a:avLst/>
+          </a:prstGeom>
+          <a:solidFill>
+            <a:srgbClr val="FF0000"/>
+          </a:solidFill>
+          <a:ln w="9525" cap="flat" cmpd="sng" algn="ctr">
+            <a:noFill/>
+            <a:prstDash val="solid"/>
+            <a:round/>
+            <a:headEnd type="none" w="med" len="med"/>
+            <a:tailEnd type="none" w="med" len="med"/>
+          </a:ln>
+          <a:effectLst/>
+        </p:spPr>
+        <p:txBody>
+          <a:bodyPr vert="horz" wrap="square" lIns="91440" tIns="45720" rIns="91440" bIns="45720" numCol="1" rtlCol="0" anchor="t" anchorCtr="0" compatLnSpc="1">
+            <a:prstTxWarp prst="textNoShape">
+              <a:avLst/>
+            </a:prstTxWarp>
+            <a:spAutoFit/>
+          </a:bodyPr>
+          <a:lstStyle/>
+          <a:p>
+            <a:pPr marL="0" marR="0" indent="0" algn="ctr" defTabSz="3135313" rtl="0" eaLnBrk="1" fontAlgn="base" latinLnBrk="0" hangingPunct="1">
+              <a:lnSpc>
+                <a:spcPct val="100000"/>
+              </a:lnSpc>
+              <a:spcBef>
+                <a:spcPct val="50000"/>
+              </a:spcBef>
+              <a:spcAft>
+                <a:spcPct val="0"/>
+              </a:spcAft>
+              <a:buClrTx/>
+              <a:buSzTx/>
+              <a:buFontTx/>
+              <a:buNone/>
+              <a:tabLst/>
+            </a:pPr>
+            <a:endParaRPr kumimoji="0" lang="en-US" sz="3800" b="1" i="0" u="none" strike="noStrike" cap="none" normalizeH="0" baseline="0">
+              <a:ln>
+                <a:noFill/>
+              </a:ln>
+              <a:solidFill>
+                <a:schemeClr val="tx1"/>
+              </a:solidFill>
+              <a:effectLst/>
+              <a:latin typeface="Arial" charset="0"/>
+              <a:cs typeface="Arial" charset="0"/>
+            </a:endParaRPr>
+          </a:p>
+        </p:txBody>
+      </p:sp>
+      <p:sp>
+        <p:nvSpPr>
+          <p:cNvPr id="44" name="Down Arrow 2"/>
+          <p:cNvSpPr/>
+          <p:nvPr/>
+        </p:nvSpPr>
+        <p:spPr bwMode="auto">
+          <a:xfrm rot="16200000">
+            <a:off x="8655485" y="20305771"/>
+            <a:ext cx="721934" cy="688296"/>
+          </a:xfrm>
+          <a:prstGeom prst="downArrow">
+            <a:avLst/>
+          </a:prstGeom>
+          <a:solidFill>
+            <a:schemeClr val="tx1"/>
+          </a:solidFill>
+          <a:ln w="9525" cap="flat" cmpd="sng" algn="ctr">
+            <a:noFill/>
+            <a:prstDash val="solid"/>
+            <a:round/>
+            <a:headEnd type="none" w="med" len="med"/>
+            <a:tailEnd type="none" w="med" len="med"/>
+          </a:ln>
+          <a:effectLst/>
+        </p:spPr>
+        <p:txBody>
+          <a:bodyPr vert="horz" wrap="square" lIns="91440" tIns="45720" rIns="91440" bIns="45720" numCol="1" rtlCol="0" anchor="t" anchorCtr="0" compatLnSpc="1">
+            <a:prstTxWarp prst="textNoShape">
+              <a:avLst/>
+            </a:prstTxWarp>
+            <a:spAutoFit/>
+          </a:bodyPr>
+          <a:lstStyle/>
+          <a:p>
+            <a:pPr marL="0" marR="0" indent="0" algn="ctr" defTabSz="3135313" rtl="0" eaLnBrk="1" fontAlgn="base" latinLnBrk="0" hangingPunct="1">
+              <a:lnSpc>
+                <a:spcPct val="100000"/>
+              </a:lnSpc>
+              <a:spcBef>
+                <a:spcPct val="50000"/>
+              </a:spcBef>
+              <a:spcAft>
+                <a:spcPct val="0"/>
+              </a:spcAft>
+              <a:buClrTx/>
+              <a:buSzTx/>
+              <a:buFontTx/>
+              <a:buNone/>
+              <a:tabLst/>
+            </a:pPr>
+            <a:endParaRPr kumimoji="0" lang="en-US" sz="3800" b="1" i="0" u="none" strike="noStrike" cap="none" normalizeH="0" baseline="0">
+              <a:ln>
+                <a:noFill/>
+              </a:ln>
+              <a:solidFill>
+                <a:schemeClr val="tx1"/>
+              </a:solidFill>
+              <a:effectLst/>
+              <a:latin typeface="Arial" charset="0"/>
+              <a:cs typeface="Arial" charset="0"/>
+            </a:endParaRPr>
+          </a:p>
+        </p:txBody>
+      </p:sp>
+      <p:sp>
+        <p:nvSpPr>
+          <p:cNvPr id="45" name="Down Arrow 2"/>
+          <p:cNvSpPr/>
+          <p:nvPr/>
+        </p:nvSpPr>
+        <p:spPr bwMode="auto">
+          <a:xfrm rot="5400000">
+            <a:off x="8520295" y="19360972"/>
+            <a:ext cx="721934" cy="688296"/>
+          </a:xfrm>
+          <a:prstGeom prst="downArrow">
+            <a:avLst/>
+          </a:prstGeom>
+          <a:solidFill>
+            <a:schemeClr val="tx1"/>
+          </a:solidFill>
+          <a:ln w="9525" cap="flat" cmpd="sng" algn="ctr">
+            <a:noFill/>
+            <a:prstDash val="solid"/>
+            <a:round/>
+            <a:headEnd type="none" w="med" len="med"/>
+            <a:tailEnd type="none" w="med" len="med"/>
+          </a:ln>
+          <a:effectLst/>
+        </p:spPr>
+        <p:txBody>
+          <a:bodyPr vert="horz" wrap="square" lIns="91440" tIns="45720" rIns="91440" bIns="45720" numCol="1" rtlCol="0" anchor="t" anchorCtr="0" compatLnSpc="1">
+            <a:prstTxWarp prst="textNoShape">
+              <a:avLst/>
+            </a:prstTxWarp>
+            <a:spAutoFit/>
+          </a:bodyPr>
+          <a:lstStyle/>
+          <a:p>
+            <a:pPr marL="0" marR="0" indent="0" algn="ctr" defTabSz="3135313" rtl="0" eaLnBrk="1" fontAlgn="base" latinLnBrk="0" hangingPunct="1">
+              <a:lnSpc>
+                <a:spcPct val="100000"/>
+              </a:lnSpc>
+              <a:spcBef>
+                <a:spcPct val="50000"/>
+              </a:spcBef>
+              <a:spcAft>
+                <a:spcPct val="0"/>
+              </a:spcAft>
+              <a:buClrTx/>
+              <a:buSzTx/>
+              <a:buFontTx/>
+              <a:buNone/>
+              <a:tabLst/>
+            </a:pPr>
+            <a:endParaRPr kumimoji="0" lang="en-US" sz="3800" b="1" i="0" u="none" strike="noStrike" cap="none" normalizeH="0" baseline="0">
+              <a:ln>
+                <a:noFill/>
+              </a:ln>
+              <a:solidFill>
+                <a:schemeClr val="tx1"/>
+              </a:solidFill>
+              <a:effectLst/>
+              <a:latin typeface="Arial" charset="0"/>
+              <a:cs typeface="Arial" charset="0"/>
+            </a:endParaRPr>
+          </a:p>
+        </p:txBody>
+      </p:sp>
+      <p:sp>
+        <p:nvSpPr>
+          <p:cNvPr id="46" name="TextBox 45"/>
+          <p:cNvSpPr txBox="1"/>
+          <p:nvPr/>
+        </p:nvSpPr>
+        <p:spPr>
+          <a:xfrm>
+            <a:off x="9505145" y="19784243"/>
+            <a:ext cx="1306786" cy="830997"/>
+          </a:xfrm>
+          <a:prstGeom prst="rect">
+            <a:avLst/>
+          </a:prstGeom>
+          <a:noFill/>
+        </p:spPr>
+        <p:txBody>
+          <a:bodyPr wrap="square" rtlCol="0">
+            <a:spAutoFit/>
+          </a:bodyPr>
+          <a:lstStyle/>
+          <a:p>
+            <a:r>
+              <a:rPr lang="en-US" sz="4800" dirty="0"/>
+              <a:t>Car</a:t>
+            </a:r>
+          </a:p>
+        </p:txBody>
+      </p:sp>
       <p:pic>
         <p:nvPicPr>
-          <p:cNvPr id="13" name="Picture 12"/>
+          <p:cNvPr id="2049" name="Picture 2048"/>
           <p:cNvPicPr>
             <a:picLocks noChangeAspect="1"/>
           </p:cNvPicPr>
@@ -4943,8 +5301,8 @@
         </p:blipFill>
         <p:spPr>
           <a:xfrm>
-            <a:off x="14565898" y="13271105"/>
-            <a:ext cx="7220958" cy="7744906"/>
+            <a:off x="12434015" y="10645616"/>
+            <a:ext cx="3648938" cy="3829132"/>
           </a:xfrm>
           <a:prstGeom prst="rect">
             <a:avLst/>
@@ -4953,79 +5311,135 @@
       </p:pic>
       <p:sp>
         <p:nvSpPr>
-          <p:cNvPr id="39" name="Down Arrow 2"/>
-          <p:cNvSpPr/>
+          <p:cNvPr id="2053" name="TextBox 2052"/>
+          <p:cNvSpPr txBox="1"/>
           <p:nvPr/>
         </p:nvSpPr>
-        <p:spPr bwMode="auto">
-          <a:xfrm rot="5400000">
-            <a:off x="4636214" y="18566994"/>
-            <a:ext cx="721934" cy="688296"/>
-          </a:xfrm>
-          <a:prstGeom prst="downArrow">
+        <p:spPr>
+          <a:xfrm>
+            <a:off x="12173375" y="14748257"/>
+            <a:ext cx="4313136" cy="677108"/>
+          </a:xfrm>
+          <a:prstGeom prst="rect">
             <a:avLst/>
           </a:prstGeom>
-          <a:solidFill>
-            <a:schemeClr val="tx1"/>
-          </a:solidFill>
-          <a:ln w="9525" cap="flat" cmpd="sng" algn="ctr">
-            <a:noFill/>
-            <a:prstDash val="solid"/>
-            <a:round/>
-            <a:headEnd type="none" w="med" len="med"/>
-            <a:tailEnd type="none" w="med" len="med"/>
-          </a:ln>
-          <a:effectLst/>
-        </p:spPr>
-        <p:txBody>
-          <a:bodyPr vert="horz" wrap="square" lIns="91440" tIns="45720" rIns="91440" bIns="45720" numCol="1" rtlCol="0" anchor="t" anchorCtr="0" compatLnSpc="1">
-            <a:prstTxWarp prst="textNoShape">
-              <a:avLst/>
-            </a:prstTxWarp>
+          <a:noFill/>
+        </p:spPr>
+        <p:txBody>
+          <a:bodyPr wrap="square" rtlCol="0">
             <a:spAutoFit/>
           </a:bodyPr>
           <a:lstStyle/>
           <a:p>
-            <a:pPr marL="0" marR="0" indent="0" algn="ctr" defTabSz="3135313" rtl="0" eaLnBrk="1" fontAlgn="base" latinLnBrk="0" hangingPunct="1">
-              <a:lnSpc>
-                <a:spcPct val="100000"/>
-              </a:lnSpc>
-              <a:spcBef>
-                <a:spcPct val="50000"/>
-              </a:spcBef>
-              <a:spcAft>
-                <a:spcPct val="0"/>
-              </a:spcAft>
-              <a:buClrTx/>
-              <a:buSzTx/>
-              <a:buFontTx/>
-              <a:buNone/>
-              <a:tabLst/>
-            </a:pPr>
-            <a:endParaRPr kumimoji="0" lang="en-US" sz="3800" b="1" i="0" u="none" strike="noStrike" cap="none" normalizeH="0" baseline="0">
-              <a:ln>
-                <a:noFill/>
-              </a:ln>
-              <a:solidFill>
-                <a:schemeClr val="tx1"/>
-              </a:solidFill>
-              <a:effectLst/>
-              <a:latin typeface="Arial" charset="0"/>
-              <a:cs typeface="Arial" charset="0"/>
-            </a:endParaRPr>
-          </a:p>
-        </p:txBody>
-      </p:sp>
-      <p:sp>
-        <p:nvSpPr>
-          <p:cNvPr id="27" name="TextBox 26"/>
+            <a:r>
+              <a:rPr lang="en-US" dirty="0"/>
+              <a:t>Circuit Schematic</a:t>
+            </a:r>
+          </a:p>
+        </p:txBody>
+      </p:sp>
+      <p:sp>
+        <p:nvSpPr>
+          <p:cNvPr id="49" name="TextBox 48"/>
           <p:cNvSpPr txBox="1"/>
           <p:nvPr/>
         </p:nvSpPr>
         <p:spPr>
           <a:xfrm>
-            <a:off x="685800" y="5208339"/>
-            <a:ext cx="10668000" cy="6894195"/>
+            <a:off x="17045928" y="14748257"/>
+            <a:ext cx="3329737" cy="677108"/>
+          </a:xfrm>
+          <a:prstGeom prst="rect">
+            <a:avLst/>
+          </a:prstGeom>
+          <a:noFill/>
+        </p:spPr>
+        <p:txBody>
+          <a:bodyPr wrap="square" rtlCol="0">
+            <a:spAutoFit/>
+          </a:bodyPr>
+          <a:lstStyle/>
+          <a:p>
+            <a:r>
+              <a:rPr lang="en-US" dirty="0"/>
+              <a:t>Board layout</a:t>
+            </a:r>
+          </a:p>
+        </p:txBody>
+      </p:sp>
+      <p:sp>
+        <p:nvSpPr>
+          <p:cNvPr id="2054" name="TextBox 2053"/>
+          <p:cNvSpPr txBox="1"/>
+          <p:nvPr/>
+        </p:nvSpPr>
+        <p:spPr>
+          <a:xfrm>
+            <a:off x="536114" y="533400"/>
+            <a:ext cx="5476470" cy="685800"/>
+          </a:xfrm>
+          <a:prstGeom prst="rect">
+            <a:avLst/>
+          </a:prstGeom>
+          <a:noFill/>
+        </p:spPr>
+        <p:txBody>
+          <a:bodyPr wrap="square" rtlCol="0">
+            <a:spAutoFit/>
+          </a:bodyPr>
+          <a:lstStyle/>
+          <a:p>
+            <a:r>
+              <a:rPr lang="en-US" dirty="0" err="1"/>
+              <a:t>Youtube</a:t>
+            </a:r>
+            <a:r>
+              <a:rPr lang="en-US" dirty="0"/>
+              <a:t> link</a:t>
+            </a:r>
+          </a:p>
+        </p:txBody>
+      </p:sp>
+      <p:pic>
+        <p:nvPicPr>
+          <p:cNvPr id="2055" name="Picture 2054"/>
+          <p:cNvPicPr>
+            <a:picLocks noChangeAspect="1"/>
+          </p:cNvPicPr>
+          <p:nvPr/>
+        </p:nvPicPr>
+        <p:blipFill>
+          <a:blip r:embed="rId5" cstate="print">
+            <a:extLst>
+              <a:ext uri="{28A0092B-C50C-407E-A947-70E740481C1C}">
+                <a14:useLocalDpi xmlns:a14="http://schemas.microsoft.com/office/drawing/2010/main" val="0"/>
+              </a:ext>
+            </a:extLst>
+          </a:blip>
+          <a:stretch>
+            <a:fillRect/>
+          </a:stretch>
+        </p:blipFill>
+        <p:spPr>
+          <a:xfrm>
+            <a:off x="22939281" y="16403376"/>
+            <a:ext cx="4092362" cy="2802608"/>
+          </a:xfrm>
+          <a:prstGeom prst="rect">
+            <a:avLst/>
+          </a:prstGeom>
+        </p:spPr>
+      </p:pic>
+      <p:sp>
+        <p:nvSpPr>
+          <p:cNvPr id="54" name="TextBox 53"/>
+          <p:cNvSpPr txBox="1"/>
+          <p:nvPr/>
+        </p:nvSpPr>
+        <p:spPr>
+          <a:xfrm>
+            <a:off x="11771436" y="15983143"/>
+            <a:ext cx="10668000" cy="5324535"/>
           </a:xfrm>
           <a:prstGeom prst="rect">
             <a:avLst/>
@@ -5045,37 +5459,339 @@
           <a:p>
             <a:r>
               <a:rPr lang="en-US" sz="4000" dirty="0"/>
-              <a:t>Implementation</a:t>
-            </a:r>
-          </a:p>
+              <a:t>Additional Design Work</a:t>
+            </a:r>
+          </a:p>
+          <a:p>
+            <a:r>
+              <a:rPr lang="en-US" sz="4000" dirty="0"/>
+              <a:t>The PCB was created in Eagle and produced at </a:t>
+            </a:r>
+            <a:r>
+              <a:rPr lang="en-US" sz="4000" dirty="0" err="1"/>
+              <a:t>OSHPark</a:t>
+            </a:r>
+            <a:r>
+              <a:rPr lang="en-US" sz="4000" dirty="0"/>
+              <a:t>. 3D-printed enclosures for both the LIDAR and boards Autodesk Fusion and printed on a </a:t>
+            </a:r>
+            <a:r>
+              <a:rPr lang="en-US" sz="4000" dirty="0" err="1"/>
+              <a:t>Printrbot</a:t>
+            </a:r>
+            <a:r>
+              <a:rPr lang="en-US" sz="4000" dirty="0"/>
+              <a:t> Simple Metal. The LIDAR is attached to the hood of a car using neodymium magnets</a:t>
+            </a:r>
+          </a:p>
+        </p:txBody>
+      </p:sp>
+      <p:sp>
+        <p:nvSpPr>
+          <p:cNvPr id="56" name="TextBox 55"/>
+          <p:cNvSpPr txBox="1"/>
+          <p:nvPr/>
+        </p:nvSpPr>
+        <p:spPr>
+          <a:xfrm>
+            <a:off x="22677747" y="19250053"/>
+            <a:ext cx="4313136" cy="1754326"/>
+          </a:xfrm>
+          <a:prstGeom prst="rect">
+            <a:avLst/>
+          </a:prstGeom>
+          <a:noFill/>
+        </p:spPr>
+        <p:txBody>
+          <a:bodyPr wrap="square" rtlCol="0">
+            <a:spAutoFit/>
+          </a:bodyPr>
+          <a:lstStyle/>
           <a:p>
             <a:r>
               <a:rPr lang="en-US" sz="3600" dirty="0"/>
-              <a:t>This project obtains its speed measurement by continuously polling a speed reading from the Engine Control Unit (ECU) of a car via the OBD port of a car.</a:t>
-            </a:r>
-          </a:p>
+              <a:t>LIDAR in its enclosure attached to a car</a:t>
+            </a:r>
+          </a:p>
+        </p:txBody>
+      </p:sp>
+      <p:pic>
+        <p:nvPicPr>
+          <p:cNvPr id="2058" name="Picture 2057"/>
+          <p:cNvPicPr>
+            <a:picLocks noChangeAspect="1"/>
+          </p:cNvPicPr>
+          <p:nvPr/>
+        </p:nvPicPr>
+        <p:blipFill>
+          <a:blip r:embed="rId6">
+            <a:extLst>
+              <a:ext uri="{28A0092B-C50C-407E-A947-70E740481C1C}">
+                <a14:useLocalDpi xmlns:a14="http://schemas.microsoft.com/office/drawing/2010/main" val="0"/>
+              </a:ext>
+            </a:extLst>
+          </a:blip>
+          <a:stretch>
+            <a:fillRect/>
+          </a:stretch>
+        </p:blipFill>
+        <p:spPr>
+          <a:xfrm>
+            <a:off x="17025146" y="5910269"/>
+            <a:ext cx="3627361" cy="2834336"/>
+          </a:xfrm>
+          <a:prstGeom prst="rect">
+            <a:avLst/>
+          </a:prstGeom>
+        </p:spPr>
+      </p:pic>
+      <p:sp>
+        <p:nvSpPr>
+          <p:cNvPr id="2059" name="TextBox 2058"/>
+          <p:cNvSpPr txBox="1"/>
+          <p:nvPr/>
+        </p:nvSpPr>
+        <p:spPr>
+          <a:xfrm>
+            <a:off x="16758985" y="8778996"/>
+            <a:ext cx="4068359" cy="1754326"/>
+          </a:xfrm>
+          <a:prstGeom prst="rect">
+            <a:avLst/>
+          </a:prstGeom>
+          <a:noFill/>
+        </p:spPr>
+        <p:txBody>
+          <a:bodyPr wrap="square" rtlCol="0">
+            <a:spAutoFit/>
+          </a:bodyPr>
+          <a:lstStyle/>
           <a:p>
             <a:r>
               <a:rPr lang="en-US" sz="3600" dirty="0"/>
-              <a:t>This project</a:t>
-            </a:r>
-          </a:p>
+              <a:t>The displays reflecting off the windshield</a:t>
+            </a:r>
+            <a:endParaRPr lang="en-US" dirty="0"/>
+          </a:p>
+        </p:txBody>
+      </p:sp>
+      <p:pic>
+        <p:nvPicPr>
+          <p:cNvPr id="2060" name="Picture 2059"/>
+          <p:cNvPicPr>
+            <a:picLocks noChangeAspect="1"/>
+          </p:cNvPicPr>
+          <p:nvPr/>
+        </p:nvPicPr>
+        <p:blipFill>
+          <a:blip r:embed="rId7" cstate="print">
+            <a:extLst>
+              <a:ext uri="{28A0092B-C50C-407E-A947-70E740481C1C}">
+                <a14:useLocalDpi xmlns:a14="http://schemas.microsoft.com/office/drawing/2010/main" val="0"/>
+              </a:ext>
+            </a:extLst>
+          </a:blip>
+          <a:stretch>
+            <a:fillRect/>
+          </a:stretch>
+        </p:blipFill>
+        <p:spPr>
+          <a:xfrm>
+            <a:off x="11732341" y="5910269"/>
+            <a:ext cx="4682353" cy="2834336"/>
+          </a:xfrm>
+          <a:prstGeom prst="rect">
+            <a:avLst/>
+          </a:prstGeom>
+        </p:spPr>
+      </p:pic>
+      <p:sp>
+        <p:nvSpPr>
+          <p:cNvPr id="60" name="TextBox 59"/>
+          <p:cNvSpPr txBox="1"/>
+          <p:nvPr/>
+        </p:nvSpPr>
+        <p:spPr>
+          <a:xfrm>
+            <a:off x="11732342" y="8851523"/>
+            <a:ext cx="4757748" cy="646331"/>
+          </a:xfrm>
+          <a:prstGeom prst="rect">
+            <a:avLst/>
+          </a:prstGeom>
+          <a:noFill/>
+        </p:spPr>
+        <p:txBody>
+          <a:bodyPr wrap="square" rtlCol="0">
+            <a:spAutoFit/>
+          </a:bodyPr>
+          <a:lstStyle/>
           <a:p>
             <a:r>
               <a:rPr lang="en-US" sz="3600" dirty="0"/>
-              <a:t>LEDs are displayed at varying brightness to </a:t>
-            </a:r>
-            <a:r>
-              <a:rPr lang="en-US" sz="3600" dirty="0" err="1"/>
-              <a:t>tellt</a:t>
-            </a:r>
-            <a:r>
-              <a:rPr lang="en-US" sz="3600" dirty="0"/>
-              <a:t> eh driver whether to slow down or speed up The display is reflected off of the windshield. </a:t>
+              <a:t>Project in Operation</a:t>
+            </a:r>
+            <a:endParaRPr lang="en-US" dirty="0"/>
+          </a:p>
+        </p:txBody>
+      </p:sp>
+      <p:sp>
+        <p:nvSpPr>
+          <p:cNvPr id="2061" name="TextBox 2060"/>
+          <p:cNvSpPr txBox="1"/>
+          <p:nvPr/>
+        </p:nvSpPr>
+        <p:spPr>
+          <a:xfrm>
+            <a:off x="6817162" y="1960110"/>
+            <a:ext cx="19676210" cy="769441"/>
+          </a:xfrm>
+          <a:prstGeom prst="rect">
+            <a:avLst/>
+          </a:prstGeom>
+          <a:noFill/>
+        </p:spPr>
+        <p:txBody>
+          <a:bodyPr wrap="square" rtlCol="0">
+            <a:spAutoFit/>
+          </a:bodyPr>
+          <a:lstStyle/>
+          <a:p>
+            <a:r>
+              <a:rPr lang="en-US" sz="4400" dirty="0"/>
+              <a:t>“The HUD that will help your </a:t>
+            </a:r>
+            <a:r>
+              <a:rPr lang="en-US" sz="4400" dirty="0"/>
+              <a:t>BFFAM improve his driving skills”</a:t>
+            </a:r>
+            <a:endParaRPr lang="en-US" sz="4400" dirty="0"/>
+          </a:p>
+        </p:txBody>
+      </p:sp>
+      <p:sp>
+        <p:nvSpPr>
+          <p:cNvPr id="63" name="TextBox 62"/>
+          <p:cNvSpPr txBox="1"/>
+          <p:nvPr/>
+        </p:nvSpPr>
+        <p:spPr>
+          <a:xfrm>
+            <a:off x="21849422" y="10865363"/>
+            <a:ext cx="10668000" cy="1631216"/>
+          </a:xfrm>
+          <a:prstGeom prst="rect">
+            <a:avLst/>
+          </a:prstGeom>
+          <a:noFill/>
+          <a:ln>
+            <a:solidFill>
+              <a:schemeClr val="tx1"/>
+            </a:solidFill>
+          </a:ln>
+        </p:spPr>
+        <p:txBody>
+          <a:bodyPr wrap="square" rtlCol="0">
+            <a:spAutoFit/>
+          </a:bodyPr>
+          <a:lstStyle/>
+          <a:p>
+            <a:r>
+              <a:rPr lang="en-US" sz="4000" dirty="0"/>
+              <a:t>Additional Circuitry</a:t>
+            </a:r>
+          </a:p>
+          <a:p>
+            <a:r>
+              <a:rPr lang="en-US" sz="4000" dirty="0"/>
+              <a:t>Pat write your stuff here</a:t>
+            </a:r>
+          </a:p>
+        </p:txBody>
+      </p:sp>
+      <p:sp>
+        <p:nvSpPr>
+          <p:cNvPr id="64" name="TextBox 63"/>
+          <p:cNvSpPr txBox="1"/>
+          <p:nvPr/>
+        </p:nvSpPr>
+        <p:spPr>
+          <a:xfrm>
+            <a:off x="28604417" y="14193321"/>
+            <a:ext cx="3619656" cy="6555641"/>
+          </a:xfrm>
+          <a:prstGeom prst="rect">
+            <a:avLst/>
+          </a:prstGeom>
+          <a:noFill/>
+          <a:ln>
+            <a:solidFill>
+              <a:schemeClr val="tx1"/>
+            </a:solidFill>
+          </a:ln>
+        </p:spPr>
+        <p:txBody>
+          <a:bodyPr wrap="square" rtlCol="0">
+            <a:spAutoFit/>
+          </a:bodyPr>
+          <a:lstStyle/>
+          <a:p>
+            <a:r>
+              <a:rPr lang="en-US" sz="4000" dirty="0"/>
+              <a:t>Future Work</a:t>
+            </a:r>
+          </a:p>
+          <a:p>
+            <a:r>
+              <a:rPr lang="en-US" sz="4000" dirty="0"/>
+              <a:t>Pat write your lifelong dreams here</a:t>
             </a:r>
           </a:p>
           <a:p>
             <a:endParaRPr lang="en-US" sz="4000" dirty="0"/>
+          </a:p>
+          <a:p>
+            <a:endParaRPr lang="en-US" sz="4000" dirty="0"/>
+          </a:p>
+          <a:p>
+            <a:endParaRPr lang="en-US" sz="4000" dirty="0"/>
+          </a:p>
+          <a:p>
+            <a:endParaRPr lang="en-US" sz="4000" dirty="0"/>
+          </a:p>
+        </p:txBody>
+      </p:sp>
+      <p:sp>
+        <p:nvSpPr>
+          <p:cNvPr id="2063" name="TextBox 2062"/>
+          <p:cNvSpPr txBox="1"/>
+          <p:nvPr/>
+        </p:nvSpPr>
+        <p:spPr>
+          <a:xfrm>
+            <a:off x="3274349" y="12192000"/>
+            <a:ext cx="8059473" cy="677108"/>
+          </a:xfrm>
+          <a:prstGeom prst="rect">
+            <a:avLst/>
+          </a:prstGeom>
+          <a:noFill/>
+          <a:ln>
+            <a:solidFill>
+              <a:schemeClr val="tx1"/>
+            </a:solidFill>
+          </a:ln>
+        </p:spPr>
+        <p:txBody>
+          <a:bodyPr wrap="square" rtlCol="0">
+            <a:spAutoFit/>
+          </a:bodyPr>
+          <a:lstStyle/>
+          <a:p>
+            <a:r>
+              <a:rPr lang="en-US" dirty="0"/>
+              <a:t>Tyler won’t see this</a:t>
+            </a:r>
           </a:p>
         </p:txBody>
       </p:sp>

</xml_diff>

<commit_message>
wrote more explicit documentation and fixed formatting in in main.c and updated README with relevent technologies
</commit_message>
<xml_diff>
--- a/Documentation/MP_poster.pptx
+++ b/Documentation/MP_poster.pptx
@@ -238,7 +238,7 @@
           <a:p>
             <a:fld id="{29402C54-35C0-46B1-A692-432A8F06422E}" type="datetimeFigureOut">
               <a:rPr lang="en-US" smtClean="0"/>
-              <a:t>12/6/2016</a:t>
+              <a:t>12/7/2016</a:t>
             </a:fld>
             <a:endParaRPr lang="en-US"/>
           </a:p>
@@ -333,7 +333,6 @@
               <a:rPr lang="en-US"/>
               <a:t>Fifth level</a:t>
             </a:r>
-            <a:endParaRPr lang="en-US"/>
           </a:p>
         </p:txBody>
       </p:sp>
@@ -4497,7 +4496,6 @@
               <a:rPr lang="en-US" sz="4000" dirty="0"/>
               <a:t>This project uses the ATD to receive a PWM signal from the LIDAR, the TIM module to control LED refresh rates and LIDAR sampling, the SCI to communicate with the car, and the SPI module to drive 7-segments through a shift register.</a:t>
             </a:r>
-            <a:endParaRPr lang="en-US" sz="4000" dirty="0"/>
           </a:p>
         </p:txBody>
       </p:sp>
@@ -5659,13 +5657,8 @@
           <a:p>
             <a:r>
               <a:rPr lang="en-US" sz="4400" dirty="0"/>
-              <a:t>“The HUD that will help your </a:t>
-            </a:r>
-            <a:r>
-              <a:rPr lang="en-US" sz="4400" dirty="0"/>
-              <a:t>BFFAM improve his driving skills”</a:t>
-            </a:r>
-            <a:endParaRPr lang="en-US" sz="4400" dirty="0"/>
+              <a:t>“The HUD that will help your BFFAM improve his driving skills”</a:t>
+            </a:r>
           </a:p>
         </p:txBody>
       </p:sp>

</xml_diff>

<commit_message>
Added contributions to poster
</commit_message>
<xml_diff>
--- a/Documentation/MP_poster.pptx
+++ b/Documentation/MP_poster.pptx
@@ -5671,7 +5671,7 @@
         <p:spPr>
           <a:xfrm>
             <a:off x="21849422" y="10865363"/>
-            <a:ext cx="10668000" cy="1631216"/>
+            <a:ext cx="10668000" cy="3477875"/>
           </a:xfrm>
           <a:prstGeom prst="rect">
             <a:avLst/>
@@ -5697,7 +5697,23 @@
           <a:p>
             <a:r>
               <a:rPr lang="en-US" sz="4000" dirty="0"/>
-              <a:t>Pat write your stuff here</a:t>
+              <a:t>The main board interfaces to a MAX232 mounted on a </a:t>
+            </a:r>
+            <a:r>
+              <a:rPr lang="en-US" sz="4000" dirty="0" err="1"/>
+              <a:t>perfboard</a:t>
+            </a:r>
+            <a:r>
+              <a:rPr lang="en-US" sz="4000" dirty="0"/>
+              <a:t>. This is then interfaced to a </a:t>
+            </a:r>
+            <a:r>
+              <a:rPr lang="en-US" sz="4000" dirty="0" err="1"/>
+              <a:t>Sparkfun</a:t>
+            </a:r>
+            <a:r>
+              <a:rPr lang="en-US" sz="4000" dirty="0"/>
+              <a:t> OBD-to-UART board.</a:t>
             </a:r>
           </a:p>
         </p:txBody>
@@ -5710,8 +5726,8 @@
         </p:nvSpPr>
         <p:spPr>
           <a:xfrm>
-            <a:off x="28604417" y="14193321"/>
-            <a:ext cx="3619656" cy="6555641"/>
+            <a:off x="28025513" y="14652188"/>
+            <a:ext cx="3904192" cy="5940088"/>
           </a:xfrm>
           <a:prstGeom prst="rect">
             <a:avLst/>
@@ -5737,53 +5753,7 @@
           <a:p>
             <a:r>
               <a:rPr lang="en-US" sz="4000" dirty="0"/>
-              <a:t>Pat write your lifelong dreams here</a:t>
-            </a:r>
-          </a:p>
-          <a:p>
-            <a:endParaRPr lang="en-US" sz="4000" dirty="0"/>
-          </a:p>
-          <a:p>
-            <a:endParaRPr lang="en-US" sz="4000" dirty="0"/>
-          </a:p>
-          <a:p>
-            <a:endParaRPr lang="en-US" sz="4000" dirty="0"/>
-          </a:p>
-          <a:p>
-            <a:endParaRPr lang="en-US" sz="4000" dirty="0"/>
-          </a:p>
-        </p:txBody>
-      </p:sp>
-      <p:sp>
-        <p:nvSpPr>
-          <p:cNvPr id="2063" name="TextBox 2062"/>
-          <p:cNvSpPr txBox="1"/>
-          <p:nvPr/>
-        </p:nvSpPr>
-        <p:spPr>
-          <a:xfrm>
-            <a:off x="3274349" y="12192000"/>
-            <a:ext cx="8059473" cy="677108"/>
-          </a:xfrm>
-          <a:prstGeom prst="rect">
-            <a:avLst/>
-          </a:prstGeom>
-          <a:noFill/>
-          <a:ln>
-            <a:solidFill>
-              <a:schemeClr val="tx1"/>
-            </a:solidFill>
-          </a:ln>
-        </p:spPr>
-        <p:txBody>
-          <a:bodyPr wrap="square" rtlCol="0">
-            <a:spAutoFit/>
-          </a:bodyPr>
-          <a:lstStyle/>
-          <a:p>
-            <a:r>
-              <a:rPr lang="en-US" dirty="0"/>
-              <a:t>Tyler won’t see this</a:t>
+              <a:t>Consolidating all circuitry to a single board and using solderless connectors to “foolproof” the design.</a:t>
             </a:r>
           </a:p>
         </p:txBody>

</xml_diff>

<commit_message>
resized and finished ppt again
</commit_message>
<xml_diff>
--- a/Documentation/MP_poster.pptx
+++ b/Documentation/MP_poster.pptx
@@ -10,7 +10,7 @@
   <p:sldIdLst>
     <p:sldId id="256" r:id="rId2"/>
   </p:sldIdLst>
-  <p:sldSz cx="32918400" cy="21945600"/>
+  <p:sldSz cx="43891200" cy="32918400"/>
   <p:notesSz cx="6858000" cy="9144000"/>
   <p:defaultTextStyle>
     <a:defPPr>
@@ -23,7 +23,7 @@
       <a:spcAft>
         <a:spcPct val="0"/>
       </a:spcAft>
-      <a:defRPr sz="3800" b="1" kern="1200">
+      <a:defRPr sz="5700" b="1" kern="1200">
         <a:solidFill>
           <a:schemeClr val="tx1"/>
         </a:solidFill>
@@ -32,14 +32,14 @@
         <a:cs typeface="Arial" charset="0"/>
       </a:defRPr>
     </a:lvl1pPr>
-    <a:lvl2pPr marL="457200" algn="ctr" rtl="0" fontAlgn="base">
+    <a:lvl2pPr marL="685800" algn="ctr" rtl="0" fontAlgn="base">
       <a:spcBef>
         <a:spcPct val="50000"/>
       </a:spcBef>
       <a:spcAft>
         <a:spcPct val="0"/>
       </a:spcAft>
-      <a:defRPr sz="3800" b="1" kern="1200">
+      <a:defRPr sz="5700" b="1" kern="1200">
         <a:solidFill>
           <a:schemeClr val="tx1"/>
         </a:solidFill>
@@ -48,14 +48,14 @@
         <a:cs typeface="Arial" charset="0"/>
       </a:defRPr>
     </a:lvl2pPr>
-    <a:lvl3pPr marL="914400" algn="ctr" rtl="0" fontAlgn="base">
+    <a:lvl3pPr marL="1371600" algn="ctr" rtl="0" fontAlgn="base">
       <a:spcBef>
         <a:spcPct val="50000"/>
       </a:spcBef>
       <a:spcAft>
         <a:spcPct val="0"/>
       </a:spcAft>
-      <a:defRPr sz="3800" b="1" kern="1200">
+      <a:defRPr sz="5700" b="1" kern="1200">
         <a:solidFill>
           <a:schemeClr val="tx1"/>
         </a:solidFill>
@@ -64,14 +64,14 @@
         <a:cs typeface="Arial" charset="0"/>
       </a:defRPr>
     </a:lvl3pPr>
-    <a:lvl4pPr marL="1371600" algn="ctr" rtl="0" fontAlgn="base">
+    <a:lvl4pPr marL="2057400" algn="ctr" rtl="0" fontAlgn="base">
       <a:spcBef>
         <a:spcPct val="50000"/>
       </a:spcBef>
       <a:spcAft>
         <a:spcPct val="0"/>
       </a:spcAft>
-      <a:defRPr sz="3800" b="1" kern="1200">
+      <a:defRPr sz="5700" b="1" kern="1200">
         <a:solidFill>
           <a:schemeClr val="tx1"/>
         </a:solidFill>
@@ -80,14 +80,14 @@
         <a:cs typeface="Arial" charset="0"/>
       </a:defRPr>
     </a:lvl4pPr>
-    <a:lvl5pPr marL="1828800" algn="ctr" rtl="0" fontAlgn="base">
+    <a:lvl5pPr marL="2743200" algn="ctr" rtl="0" fontAlgn="base">
       <a:spcBef>
         <a:spcPct val="50000"/>
       </a:spcBef>
       <a:spcAft>
         <a:spcPct val="0"/>
       </a:spcAft>
-      <a:defRPr sz="3800" b="1" kern="1200">
+      <a:defRPr sz="5700" b="1" kern="1200">
         <a:solidFill>
           <a:schemeClr val="tx1"/>
         </a:solidFill>
@@ -96,8 +96,8 @@
         <a:cs typeface="Arial" charset="0"/>
       </a:defRPr>
     </a:lvl5pPr>
-    <a:lvl6pPr marL="2286000" algn="l" defTabSz="914400" rtl="0" eaLnBrk="1" latinLnBrk="0" hangingPunct="1">
-      <a:defRPr sz="3800" b="1" kern="1200">
+    <a:lvl6pPr marL="3429000" algn="l" defTabSz="1371600" rtl="0" eaLnBrk="1" latinLnBrk="0" hangingPunct="1">
+      <a:defRPr sz="5700" b="1" kern="1200">
         <a:solidFill>
           <a:schemeClr val="tx1"/>
         </a:solidFill>
@@ -106,8 +106,8 @@
         <a:cs typeface="Arial" charset="0"/>
       </a:defRPr>
     </a:lvl6pPr>
-    <a:lvl7pPr marL="2743200" algn="l" defTabSz="914400" rtl="0" eaLnBrk="1" latinLnBrk="0" hangingPunct="1">
-      <a:defRPr sz="3800" b="1" kern="1200">
+    <a:lvl7pPr marL="4114800" algn="l" defTabSz="1371600" rtl="0" eaLnBrk="1" latinLnBrk="0" hangingPunct="1">
+      <a:defRPr sz="5700" b="1" kern="1200">
         <a:solidFill>
           <a:schemeClr val="tx1"/>
         </a:solidFill>
@@ -116,8 +116,8 @@
         <a:cs typeface="Arial" charset="0"/>
       </a:defRPr>
     </a:lvl7pPr>
-    <a:lvl8pPr marL="3200400" algn="l" defTabSz="914400" rtl="0" eaLnBrk="1" latinLnBrk="0" hangingPunct="1">
-      <a:defRPr sz="3800" b="1" kern="1200">
+    <a:lvl8pPr marL="4800600" algn="l" defTabSz="1371600" rtl="0" eaLnBrk="1" latinLnBrk="0" hangingPunct="1">
+      <a:defRPr sz="5700" b="1" kern="1200">
         <a:solidFill>
           <a:schemeClr val="tx1"/>
         </a:solidFill>
@@ -126,8 +126,8 @@
         <a:cs typeface="Arial" charset="0"/>
       </a:defRPr>
     </a:lvl8pPr>
-    <a:lvl9pPr marL="3657600" algn="l" defTabSz="914400" rtl="0" eaLnBrk="1" latinLnBrk="0" hangingPunct="1">
-      <a:defRPr sz="3800" b="1" kern="1200">
+    <a:lvl9pPr marL="5486400" algn="l" defTabSz="1371600" rtl="0" eaLnBrk="1" latinLnBrk="0" hangingPunct="1">
+      <a:defRPr sz="5700" b="1" kern="1200">
         <a:solidFill>
           <a:schemeClr val="tx1"/>
         </a:solidFill>
@@ -140,12 +140,12 @@
   <p:extLst>
     <p:ext uri="{EFAFB233-063F-42B5-8137-9DF3F51BA10A}">
       <p15:sldGuideLst xmlns:p15="http://schemas.microsoft.com/office/powerpoint/2012/main">
-        <p15:guide id="1" orient="horz" pos="6912">
+        <p15:guide id="1" orient="horz" pos="10368" userDrawn="1">
           <p15:clr>
             <a:srgbClr val="A4A3A4"/>
           </p15:clr>
         </p15:guide>
-        <p15:guide id="2" pos="10368">
+        <p15:guide id="2" pos="13824" userDrawn="1">
           <p15:clr>
             <a:srgbClr val="A4A3A4"/>
           </p15:clr>
@@ -256,8 +256,8 @@
         </p:nvSpPr>
         <p:spPr>
           <a:xfrm>
-            <a:off x="1114425" y="1143000"/>
-            <a:ext cx="4629150" cy="3086100"/>
+            <a:off x="1371600" y="1143000"/>
+            <a:ext cx="4114800" cy="3086100"/>
           </a:xfrm>
           <a:prstGeom prst="rect">
             <a:avLst/>
@@ -411,8 +411,8 @@
   </p:cSld>
   <p:clrMap bg1="lt1" tx1="dk1" bg2="lt2" tx2="dk2" accent1="accent1" accent2="accent2" accent3="accent3" accent4="accent4" accent5="accent5" accent6="accent6" hlink="hlink" folHlink="folHlink"/>
   <p:notesStyle>
-    <a:lvl1pPr marL="0" algn="l" defTabSz="914400" rtl="0" eaLnBrk="1" latinLnBrk="0" hangingPunct="1">
-      <a:defRPr sz="1200" kern="1200">
+    <a:lvl1pPr marL="0" algn="l" defTabSz="1371600" rtl="0" eaLnBrk="1" latinLnBrk="0" hangingPunct="1">
+      <a:defRPr sz="1800" kern="1200">
         <a:solidFill>
           <a:schemeClr val="tx1"/>
         </a:solidFill>
@@ -421,8 +421,8 @@
         <a:cs typeface="+mn-cs"/>
       </a:defRPr>
     </a:lvl1pPr>
-    <a:lvl2pPr marL="457200" algn="l" defTabSz="914400" rtl="0" eaLnBrk="1" latinLnBrk="0" hangingPunct="1">
-      <a:defRPr sz="1200" kern="1200">
+    <a:lvl2pPr marL="685800" algn="l" defTabSz="1371600" rtl="0" eaLnBrk="1" latinLnBrk="0" hangingPunct="1">
+      <a:defRPr sz="1800" kern="1200">
         <a:solidFill>
           <a:schemeClr val="tx1"/>
         </a:solidFill>
@@ -431,8 +431,8 @@
         <a:cs typeface="+mn-cs"/>
       </a:defRPr>
     </a:lvl2pPr>
-    <a:lvl3pPr marL="914400" algn="l" defTabSz="914400" rtl="0" eaLnBrk="1" latinLnBrk="0" hangingPunct="1">
-      <a:defRPr sz="1200" kern="1200">
+    <a:lvl3pPr marL="1371600" algn="l" defTabSz="1371600" rtl="0" eaLnBrk="1" latinLnBrk="0" hangingPunct="1">
+      <a:defRPr sz="1800" kern="1200">
         <a:solidFill>
           <a:schemeClr val="tx1"/>
         </a:solidFill>
@@ -441,8 +441,8 @@
         <a:cs typeface="+mn-cs"/>
       </a:defRPr>
     </a:lvl3pPr>
-    <a:lvl4pPr marL="1371600" algn="l" defTabSz="914400" rtl="0" eaLnBrk="1" latinLnBrk="0" hangingPunct="1">
-      <a:defRPr sz="1200" kern="1200">
+    <a:lvl4pPr marL="2057400" algn="l" defTabSz="1371600" rtl="0" eaLnBrk="1" latinLnBrk="0" hangingPunct="1">
+      <a:defRPr sz="1800" kern="1200">
         <a:solidFill>
           <a:schemeClr val="tx1"/>
         </a:solidFill>
@@ -451,8 +451,8 @@
         <a:cs typeface="+mn-cs"/>
       </a:defRPr>
     </a:lvl4pPr>
-    <a:lvl5pPr marL="1828800" algn="l" defTabSz="914400" rtl="0" eaLnBrk="1" latinLnBrk="0" hangingPunct="1">
-      <a:defRPr sz="1200" kern="1200">
+    <a:lvl5pPr marL="2743200" algn="l" defTabSz="1371600" rtl="0" eaLnBrk="1" latinLnBrk="0" hangingPunct="1">
+      <a:defRPr sz="1800" kern="1200">
         <a:solidFill>
           <a:schemeClr val="tx1"/>
         </a:solidFill>
@@ -461,8 +461,8 @@
         <a:cs typeface="+mn-cs"/>
       </a:defRPr>
     </a:lvl5pPr>
-    <a:lvl6pPr marL="2286000" algn="l" defTabSz="914400" rtl="0" eaLnBrk="1" latinLnBrk="0" hangingPunct="1">
-      <a:defRPr sz="1200" kern="1200">
+    <a:lvl6pPr marL="3429000" algn="l" defTabSz="1371600" rtl="0" eaLnBrk="1" latinLnBrk="0" hangingPunct="1">
+      <a:defRPr sz="1800" kern="1200">
         <a:solidFill>
           <a:schemeClr val="tx1"/>
         </a:solidFill>
@@ -471,8 +471,8 @@
         <a:cs typeface="+mn-cs"/>
       </a:defRPr>
     </a:lvl6pPr>
-    <a:lvl7pPr marL="2743200" algn="l" defTabSz="914400" rtl="0" eaLnBrk="1" latinLnBrk="0" hangingPunct="1">
-      <a:defRPr sz="1200" kern="1200">
+    <a:lvl7pPr marL="4114800" algn="l" defTabSz="1371600" rtl="0" eaLnBrk="1" latinLnBrk="0" hangingPunct="1">
+      <a:defRPr sz="1800" kern="1200">
         <a:solidFill>
           <a:schemeClr val="tx1"/>
         </a:solidFill>
@@ -481,8 +481,8 @@
         <a:cs typeface="+mn-cs"/>
       </a:defRPr>
     </a:lvl7pPr>
-    <a:lvl8pPr marL="3200400" algn="l" defTabSz="914400" rtl="0" eaLnBrk="1" latinLnBrk="0" hangingPunct="1">
-      <a:defRPr sz="1200" kern="1200">
+    <a:lvl8pPr marL="4800600" algn="l" defTabSz="1371600" rtl="0" eaLnBrk="1" latinLnBrk="0" hangingPunct="1">
+      <a:defRPr sz="1800" kern="1200">
         <a:solidFill>
           <a:schemeClr val="tx1"/>
         </a:solidFill>
@@ -491,8 +491,8 @@
         <a:cs typeface="+mn-cs"/>
       </a:defRPr>
     </a:lvl8pPr>
-    <a:lvl9pPr marL="3657600" algn="l" defTabSz="914400" rtl="0" eaLnBrk="1" latinLnBrk="0" hangingPunct="1">
-      <a:defRPr sz="1200" kern="1200">
+    <a:lvl9pPr marL="5486400" algn="l" defTabSz="1371600" rtl="0" eaLnBrk="1" latinLnBrk="0" hangingPunct="1">
+      <a:defRPr sz="1800" kern="1200">
         <a:solidFill>
           <a:schemeClr val="tx1"/>
         </a:solidFill>
@@ -534,8 +534,8 @@
         </p:nvSpPr>
         <p:spPr>
           <a:xfrm>
-            <a:off x="2468563" y="6816725"/>
-            <a:ext cx="27981275" cy="4705350"/>
+            <a:off x="3291419" y="10225088"/>
+            <a:ext cx="37308366" cy="7058025"/>
           </a:xfrm>
         </p:spPr>
         <p:txBody>
@@ -561,8 +561,8 @@
         </p:nvSpPr>
         <p:spPr>
           <a:xfrm>
-            <a:off x="4937125" y="12436475"/>
-            <a:ext cx="23044150" cy="5607050"/>
+            <a:off x="6582835" y="18654713"/>
+            <a:ext cx="30725534" cy="8410575"/>
           </a:xfrm>
         </p:spPr>
         <p:txBody>
@@ -572,35 +572,35 @@
               <a:buNone/>
               <a:defRPr/>
             </a:lvl1pPr>
-            <a:lvl2pPr marL="457200" indent="0" algn="ctr">
+            <a:lvl2pPr marL="609608" indent="0" algn="ctr">
               <a:buNone/>
               <a:defRPr/>
             </a:lvl2pPr>
-            <a:lvl3pPr marL="914400" indent="0" algn="ctr">
+            <a:lvl3pPr marL="1219215" indent="0" algn="ctr">
               <a:buNone/>
               <a:defRPr/>
             </a:lvl3pPr>
-            <a:lvl4pPr marL="1371600" indent="0" algn="ctr">
+            <a:lvl4pPr marL="1828823" indent="0" algn="ctr">
               <a:buNone/>
               <a:defRPr/>
             </a:lvl4pPr>
-            <a:lvl5pPr marL="1828800" indent="0" algn="ctr">
+            <a:lvl5pPr marL="2438430" indent="0" algn="ctr">
               <a:buNone/>
               <a:defRPr/>
             </a:lvl5pPr>
-            <a:lvl6pPr marL="2286000" indent="0" algn="ctr">
+            <a:lvl6pPr marL="3048038" indent="0" algn="ctr">
               <a:buNone/>
               <a:defRPr/>
             </a:lvl6pPr>
-            <a:lvl7pPr marL="2743200" indent="0" algn="ctr">
+            <a:lvl7pPr marL="3657645" indent="0" algn="ctr">
               <a:buNone/>
               <a:defRPr/>
             </a:lvl7pPr>
-            <a:lvl8pPr marL="3200400" indent="0" algn="ctr">
+            <a:lvl8pPr marL="4267254" indent="0" algn="ctr">
               <a:buNone/>
               <a:defRPr/>
             </a:lvl8pPr>
-            <a:lvl9pPr marL="3657600" indent="0" algn="ctr">
+            <a:lvl9pPr marL="4876862" indent="0" algn="ctr">
               <a:buNone/>
               <a:defRPr/>
             </a:lvl9pPr>
@@ -930,8 +930,8 @@
         </p:nvSpPr>
         <p:spPr>
           <a:xfrm>
-            <a:off x="23866475" y="879475"/>
-            <a:ext cx="7405688" cy="18724563"/>
+            <a:off x="31821966" y="1319215"/>
+            <a:ext cx="9874251" cy="28086845"/>
           </a:xfrm>
         </p:spPr>
         <p:txBody>
@@ -957,8 +957,8 @@
         </p:nvSpPr>
         <p:spPr>
           <a:xfrm>
-            <a:off x="1646238" y="879475"/>
-            <a:ext cx="22067837" cy="18724563"/>
+            <a:off x="2194985" y="1319215"/>
+            <a:ext cx="29423783" cy="28086845"/>
           </a:xfrm>
         </p:spPr>
         <p:txBody>
@@ -1318,15 +1318,15 @@
         </p:nvSpPr>
         <p:spPr>
           <a:xfrm>
-            <a:off x="2600325" y="14101763"/>
-            <a:ext cx="27981275" cy="4359275"/>
+            <a:off x="3467102" y="21152647"/>
+            <a:ext cx="37308366" cy="6538913"/>
           </a:xfrm>
         </p:spPr>
         <p:txBody>
           <a:bodyPr anchor="t"/>
           <a:lstStyle>
             <a:lvl1pPr algn="l">
-              <a:defRPr sz="4000" b="1" cap="all"/>
+              <a:defRPr sz="5334" b="1" cap="all"/>
             </a:lvl1pPr>
           </a:lstStyle>
           <a:p>
@@ -1349,8 +1349,8 @@
         </p:nvSpPr>
         <p:spPr>
           <a:xfrm>
-            <a:off x="2600325" y="9301163"/>
-            <a:ext cx="27981275" cy="4800600"/>
+            <a:off x="3467102" y="13951745"/>
+            <a:ext cx="37308366" cy="7200900"/>
           </a:xfrm>
         </p:spPr>
         <p:txBody>
@@ -1358,39 +1358,39 @@
           <a:lstStyle>
             <a:lvl1pPr marL="0" indent="0">
               <a:buNone/>
-              <a:defRPr sz="2000"/>
+              <a:defRPr sz="2667"/>
             </a:lvl1pPr>
-            <a:lvl2pPr marL="457200" indent="0">
+            <a:lvl2pPr marL="609608" indent="0">
               <a:buNone/>
-              <a:defRPr sz="1800"/>
+              <a:defRPr sz="2400"/>
             </a:lvl2pPr>
-            <a:lvl3pPr marL="914400" indent="0">
+            <a:lvl3pPr marL="1219215" indent="0">
               <a:buNone/>
-              <a:defRPr sz="1600"/>
+              <a:defRPr sz="2133"/>
             </a:lvl3pPr>
-            <a:lvl4pPr marL="1371600" indent="0">
+            <a:lvl4pPr marL="1828823" indent="0">
               <a:buNone/>
-              <a:defRPr sz="1400"/>
+              <a:defRPr sz="1866"/>
             </a:lvl4pPr>
-            <a:lvl5pPr marL="1828800" indent="0">
+            <a:lvl5pPr marL="2438430" indent="0">
               <a:buNone/>
-              <a:defRPr sz="1400"/>
+              <a:defRPr sz="1866"/>
             </a:lvl5pPr>
-            <a:lvl6pPr marL="2286000" indent="0">
+            <a:lvl6pPr marL="3048038" indent="0">
               <a:buNone/>
-              <a:defRPr sz="1400"/>
+              <a:defRPr sz="1866"/>
             </a:lvl6pPr>
-            <a:lvl7pPr marL="2743200" indent="0">
+            <a:lvl7pPr marL="3657645" indent="0">
               <a:buNone/>
-              <a:defRPr sz="1400"/>
+              <a:defRPr sz="1866"/>
             </a:lvl7pPr>
-            <a:lvl8pPr marL="3200400" indent="0">
+            <a:lvl8pPr marL="4267254" indent="0">
               <a:buNone/>
-              <a:defRPr sz="1400"/>
+              <a:defRPr sz="1866"/>
             </a:lvl8pPr>
-            <a:lvl9pPr marL="3657600" indent="0">
+            <a:lvl9pPr marL="4876862" indent="0">
               <a:buNone/>
-              <a:defRPr sz="1400"/>
+              <a:defRPr sz="1866"/>
             </a:lvl9pPr>
           </a:lstStyle>
           <a:p>
@@ -1552,39 +1552,39 @@
         </p:nvSpPr>
         <p:spPr>
           <a:xfrm>
-            <a:off x="1646238" y="5121275"/>
-            <a:ext cx="14736762" cy="14482763"/>
+            <a:off x="2194985" y="7681915"/>
+            <a:ext cx="19649016" cy="21724145"/>
           </a:xfrm>
         </p:spPr>
         <p:txBody>
           <a:bodyPr/>
           <a:lstStyle>
             <a:lvl1pPr>
-              <a:defRPr sz="2800"/>
+              <a:defRPr sz="3734"/>
             </a:lvl1pPr>
             <a:lvl2pPr>
-              <a:defRPr sz="2400"/>
+              <a:defRPr sz="3200"/>
             </a:lvl2pPr>
             <a:lvl3pPr>
-              <a:defRPr sz="2000"/>
+              <a:defRPr sz="2667"/>
             </a:lvl3pPr>
             <a:lvl4pPr>
-              <a:defRPr sz="1800"/>
+              <a:defRPr sz="2400"/>
             </a:lvl4pPr>
             <a:lvl5pPr>
-              <a:defRPr sz="1800"/>
+              <a:defRPr sz="2400"/>
             </a:lvl5pPr>
             <a:lvl6pPr>
-              <a:defRPr sz="1800"/>
+              <a:defRPr sz="2400"/>
             </a:lvl6pPr>
             <a:lvl7pPr>
-              <a:defRPr sz="1800"/>
+              <a:defRPr sz="2400"/>
             </a:lvl7pPr>
             <a:lvl8pPr>
-              <a:defRPr sz="1800"/>
+              <a:defRPr sz="2400"/>
             </a:lvl8pPr>
             <a:lvl9pPr>
-              <a:defRPr sz="1800"/>
+              <a:defRPr sz="2400"/>
             </a:lvl9pPr>
           </a:lstStyle>
           <a:p>
@@ -1636,39 +1636,39 @@
         </p:nvSpPr>
         <p:spPr>
           <a:xfrm>
-            <a:off x="16535400" y="5121275"/>
-            <a:ext cx="14736763" cy="14482763"/>
+            <a:off x="22047202" y="7681915"/>
+            <a:ext cx="19649018" cy="21724145"/>
           </a:xfrm>
         </p:spPr>
         <p:txBody>
           <a:bodyPr/>
           <a:lstStyle>
             <a:lvl1pPr>
-              <a:defRPr sz="2800"/>
+              <a:defRPr sz="3734"/>
             </a:lvl1pPr>
             <a:lvl2pPr>
-              <a:defRPr sz="2400"/>
+              <a:defRPr sz="3200"/>
             </a:lvl2pPr>
             <a:lvl3pPr>
-              <a:defRPr sz="2000"/>
+              <a:defRPr sz="2667"/>
             </a:lvl3pPr>
             <a:lvl4pPr>
-              <a:defRPr sz="1800"/>
+              <a:defRPr sz="2400"/>
             </a:lvl4pPr>
             <a:lvl5pPr>
-              <a:defRPr sz="1800"/>
+              <a:defRPr sz="2400"/>
             </a:lvl5pPr>
             <a:lvl6pPr>
-              <a:defRPr sz="1800"/>
+              <a:defRPr sz="2400"/>
             </a:lvl6pPr>
             <a:lvl7pPr>
-              <a:defRPr sz="1800"/>
+              <a:defRPr sz="2400"/>
             </a:lvl7pPr>
             <a:lvl8pPr>
-              <a:defRPr sz="1800"/>
+              <a:defRPr sz="2400"/>
             </a:lvl8pPr>
             <a:lvl9pPr>
-              <a:defRPr sz="1800"/>
+              <a:defRPr sz="2400"/>
             </a:lvl9pPr>
           </a:lstStyle>
           <a:p>
@@ -1862,8 +1862,8 @@
         </p:nvSpPr>
         <p:spPr>
           <a:xfrm>
-            <a:off x="1646238" y="4911725"/>
-            <a:ext cx="14544675" cy="2047875"/>
+            <a:off x="2194985" y="7367588"/>
+            <a:ext cx="19392900" cy="3071813"/>
           </a:xfrm>
         </p:spPr>
         <p:txBody>
@@ -1871,39 +1871,39 @@
           <a:lstStyle>
             <a:lvl1pPr marL="0" indent="0">
               <a:buNone/>
+              <a:defRPr sz="3200" b="1"/>
+            </a:lvl1pPr>
+            <a:lvl2pPr marL="609608" indent="0">
+              <a:buNone/>
+              <a:defRPr sz="2667" b="1"/>
+            </a:lvl2pPr>
+            <a:lvl3pPr marL="1219215" indent="0">
+              <a:buNone/>
               <a:defRPr sz="2400" b="1"/>
-            </a:lvl1pPr>
-            <a:lvl2pPr marL="457200" indent="0">
+            </a:lvl3pPr>
+            <a:lvl4pPr marL="1828823" indent="0">
               <a:buNone/>
-              <a:defRPr sz="2000" b="1"/>
-            </a:lvl2pPr>
-            <a:lvl3pPr marL="914400" indent="0">
+              <a:defRPr sz="2133" b="1"/>
+            </a:lvl4pPr>
+            <a:lvl5pPr marL="2438430" indent="0">
               <a:buNone/>
-              <a:defRPr sz="1800" b="1"/>
-            </a:lvl3pPr>
-            <a:lvl4pPr marL="1371600" indent="0">
+              <a:defRPr sz="2133" b="1"/>
+            </a:lvl5pPr>
+            <a:lvl6pPr marL="3048038" indent="0">
               <a:buNone/>
-              <a:defRPr sz="1600" b="1"/>
-            </a:lvl4pPr>
-            <a:lvl5pPr marL="1828800" indent="0">
+              <a:defRPr sz="2133" b="1"/>
+            </a:lvl6pPr>
+            <a:lvl7pPr marL="3657645" indent="0">
               <a:buNone/>
-              <a:defRPr sz="1600" b="1"/>
-            </a:lvl5pPr>
-            <a:lvl6pPr marL="2286000" indent="0">
+              <a:defRPr sz="2133" b="1"/>
+            </a:lvl7pPr>
+            <a:lvl8pPr marL="4267254" indent="0">
               <a:buNone/>
-              <a:defRPr sz="1600" b="1"/>
-            </a:lvl6pPr>
-            <a:lvl7pPr marL="2743200" indent="0">
+              <a:defRPr sz="2133" b="1"/>
+            </a:lvl8pPr>
+            <a:lvl9pPr marL="4876862" indent="0">
               <a:buNone/>
-              <a:defRPr sz="1600" b="1"/>
-            </a:lvl7pPr>
-            <a:lvl8pPr marL="3200400" indent="0">
-              <a:buNone/>
-              <a:defRPr sz="1600" b="1"/>
-            </a:lvl8pPr>
-            <a:lvl9pPr marL="3657600" indent="0">
-              <a:buNone/>
-              <a:defRPr sz="1600" b="1"/>
+              <a:defRPr sz="2133" b="1"/>
             </a:lvl9pPr>
           </a:lstStyle>
           <a:p>
@@ -1927,39 +1927,39 @@
         </p:nvSpPr>
         <p:spPr>
           <a:xfrm>
-            <a:off x="1646238" y="6959600"/>
-            <a:ext cx="14544675" cy="12644438"/>
+            <a:off x="2194985" y="10439400"/>
+            <a:ext cx="19392900" cy="18966657"/>
           </a:xfrm>
         </p:spPr>
         <p:txBody>
           <a:bodyPr/>
           <a:lstStyle>
             <a:lvl1pPr>
-              <a:defRPr sz="2400"/>
+              <a:defRPr sz="3200"/>
             </a:lvl1pPr>
             <a:lvl2pPr>
-              <a:defRPr sz="2000"/>
+              <a:defRPr sz="2667"/>
             </a:lvl2pPr>
             <a:lvl3pPr>
-              <a:defRPr sz="1800"/>
+              <a:defRPr sz="2400"/>
             </a:lvl3pPr>
             <a:lvl4pPr>
-              <a:defRPr sz="1600"/>
+              <a:defRPr sz="2133"/>
             </a:lvl4pPr>
             <a:lvl5pPr>
-              <a:defRPr sz="1600"/>
+              <a:defRPr sz="2133"/>
             </a:lvl5pPr>
             <a:lvl6pPr>
-              <a:defRPr sz="1600"/>
+              <a:defRPr sz="2133"/>
             </a:lvl6pPr>
             <a:lvl7pPr>
-              <a:defRPr sz="1600"/>
+              <a:defRPr sz="2133"/>
             </a:lvl7pPr>
             <a:lvl8pPr>
-              <a:defRPr sz="1600"/>
+              <a:defRPr sz="2133"/>
             </a:lvl8pPr>
             <a:lvl9pPr>
-              <a:defRPr sz="1600"/>
+              <a:defRPr sz="2133"/>
             </a:lvl9pPr>
           </a:lstStyle>
           <a:p>
@@ -2011,8 +2011,8 @@
         </p:nvSpPr>
         <p:spPr>
           <a:xfrm>
-            <a:off x="16722725" y="4911725"/>
-            <a:ext cx="14549438" cy="2047875"/>
+            <a:off x="22296966" y="7367588"/>
+            <a:ext cx="19399251" cy="3071813"/>
           </a:xfrm>
         </p:spPr>
         <p:txBody>
@@ -2020,39 +2020,39 @@
           <a:lstStyle>
             <a:lvl1pPr marL="0" indent="0">
               <a:buNone/>
+              <a:defRPr sz="3200" b="1"/>
+            </a:lvl1pPr>
+            <a:lvl2pPr marL="609608" indent="0">
+              <a:buNone/>
+              <a:defRPr sz="2667" b="1"/>
+            </a:lvl2pPr>
+            <a:lvl3pPr marL="1219215" indent="0">
+              <a:buNone/>
               <a:defRPr sz="2400" b="1"/>
-            </a:lvl1pPr>
-            <a:lvl2pPr marL="457200" indent="0">
+            </a:lvl3pPr>
+            <a:lvl4pPr marL="1828823" indent="0">
               <a:buNone/>
-              <a:defRPr sz="2000" b="1"/>
-            </a:lvl2pPr>
-            <a:lvl3pPr marL="914400" indent="0">
+              <a:defRPr sz="2133" b="1"/>
+            </a:lvl4pPr>
+            <a:lvl5pPr marL="2438430" indent="0">
               <a:buNone/>
-              <a:defRPr sz="1800" b="1"/>
-            </a:lvl3pPr>
-            <a:lvl4pPr marL="1371600" indent="0">
+              <a:defRPr sz="2133" b="1"/>
+            </a:lvl5pPr>
+            <a:lvl6pPr marL="3048038" indent="0">
               <a:buNone/>
-              <a:defRPr sz="1600" b="1"/>
-            </a:lvl4pPr>
-            <a:lvl5pPr marL="1828800" indent="0">
+              <a:defRPr sz="2133" b="1"/>
+            </a:lvl6pPr>
+            <a:lvl7pPr marL="3657645" indent="0">
               <a:buNone/>
-              <a:defRPr sz="1600" b="1"/>
-            </a:lvl5pPr>
-            <a:lvl6pPr marL="2286000" indent="0">
+              <a:defRPr sz="2133" b="1"/>
+            </a:lvl7pPr>
+            <a:lvl8pPr marL="4267254" indent="0">
               <a:buNone/>
-              <a:defRPr sz="1600" b="1"/>
-            </a:lvl6pPr>
-            <a:lvl7pPr marL="2743200" indent="0">
+              <a:defRPr sz="2133" b="1"/>
+            </a:lvl8pPr>
+            <a:lvl9pPr marL="4876862" indent="0">
               <a:buNone/>
-              <a:defRPr sz="1600" b="1"/>
-            </a:lvl7pPr>
-            <a:lvl8pPr marL="3200400" indent="0">
-              <a:buNone/>
-              <a:defRPr sz="1600" b="1"/>
-            </a:lvl8pPr>
-            <a:lvl9pPr marL="3657600" indent="0">
-              <a:buNone/>
-              <a:defRPr sz="1600" b="1"/>
+              <a:defRPr sz="2133" b="1"/>
             </a:lvl9pPr>
           </a:lstStyle>
           <a:p>
@@ -2076,39 +2076,39 @@
         </p:nvSpPr>
         <p:spPr>
           <a:xfrm>
-            <a:off x="16722725" y="6959600"/>
-            <a:ext cx="14549438" cy="12644438"/>
+            <a:off x="22296966" y="10439400"/>
+            <a:ext cx="19399251" cy="18966657"/>
           </a:xfrm>
         </p:spPr>
         <p:txBody>
           <a:bodyPr/>
           <a:lstStyle>
             <a:lvl1pPr>
-              <a:defRPr sz="2400"/>
+              <a:defRPr sz="3200"/>
             </a:lvl1pPr>
             <a:lvl2pPr>
-              <a:defRPr sz="2000"/>
+              <a:defRPr sz="2667"/>
             </a:lvl2pPr>
             <a:lvl3pPr>
-              <a:defRPr sz="1800"/>
+              <a:defRPr sz="2400"/>
             </a:lvl3pPr>
             <a:lvl4pPr>
-              <a:defRPr sz="1600"/>
+              <a:defRPr sz="2133"/>
             </a:lvl4pPr>
             <a:lvl5pPr>
-              <a:defRPr sz="1600"/>
+              <a:defRPr sz="2133"/>
             </a:lvl5pPr>
             <a:lvl6pPr>
-              <a:defRPr sz="1600"/>
+              <a:defRPr sz="2133"/>
             </a:lvl6pPr>
             <a:lvl7pPr>
-              <a:defRPr sz="1600"/>
+              <a:defRPr sz="2133"/>
             </a:lvl7pPr>
             <a:lvl8pPr>
-              <a:defRPr sz="1600"/>
+              <a:defRPr sz="2133"/>
             </a:lvl8pPr>
             <a:lvl9pPr>
-              <a:defRPr sz="1600"/>
+              <a:defRPr sz="2133"/>
             </a:lvl9pPr>
           </a:lstStyle>
           <a:p>
@@ -2530,15 +2530,15 @@
         </p:nvSpPr>
         <p:spPr>
           <a:xfrm>
-            <a:off x="1646238" y="873125"/>
-            <a:ext cx="10829925" cy="3719513"/>
+            <a:off x="2194985" y="1309690"/>
+            <a:ext cx="14439900" cy="5579270"/>
           </a:xfrm>
         </p:spPr>
         <p:txBody>
           <a:bodyPr anchor="b"/>
           <a:lstStyle>
             <a:lvl1pPr algn="l">
-              <a:defRPr sz="2000" b="1"/>
+              <a:defRPr sz="2667" b="1"/>
             </a:lvl1pPr>
           </a:lstStyle>
           <a:p>
@@ -2561,39 +2561,39 @@
         </p:nvSpPr>
         <p:spPr>
           <a:xfrm>
-            <a:off x="12869863" y="873125"/>
-            <a:ext cx="18402300" cy="18730913"/>
+            <a:off x="17159817" y="1309690"/>
+            <a:ext cx="24536400" cy="28096370"/>
           </a:xfrm>
         </p:spPr>
         <p:txBody>
           <a:bodyPr/>
           <a:lstStyle>
             <a:lvl1pPr>
-              <a:defRPr sz="3200"/>
+              <a:defRPr sz="4266"/>
             </a:lvl1pPr>
             <a:lvl2pPr>
-              <a:defRPr sz="2800"/>
+              <a:defRPr sz="3734"/>
             </a:lvl2pPr>
             <a:lvl3pPr>
-              <a:defRPr sz="2400"/>
+              <a:defRPr sz="3200"/>
             </a:lvl3pPr>
             <a:lvl4pPr>
-              <a:defRPr sz="2000"/>
+              <a:defRPr sz="2667"/>
             </a:lvl4pPr>
             <a:lvl5pPr>
-              <a:defRPr sz="2000"/>
+              <a:defRPr sz="2667"/>
             </a:lvl5pPr>
             <a:lvl6pPr>
-              <a:defRPr sz="2000"/>
+              <a:defRPr sz="2667"/>
             </a:lvl6pPr>
             <a:lvl7pPr>
-              <a:defRPr sz="2000"/>
+              <a:defRPr sz="2667"/>
             </a:lvl7pPr>
             <a:lvl8pPr>
-              <a:defRPr sz="2000"/>
+              <a:defRPr sz="2667"/>
             </a:lvl8pPr>
             <a:lvl9pPr>
-              <a:defRPr sz="2000"/>
+              <a:defRPr sz="2667"/>
             </a:lvl9pPr>
           </a:lstStyle>
           <a:p>
@@ -2645,8 +2645,8 @@
         </p:nvSpPr>
         <p:spPr>
           <a:xfrm>
-            <a:off x="1646238" y="4592638"/>
-            <a:ext cx="10829925" cy="15011400"/>
+            <a:off x="2194985" y="6888957"/>
+            <a:ext cx="14439900" cy="22517100"/>
           </a:xfrm>
         </p:spPr>
         <p:txBody>
@@ -2654,39 +2654,39 @@
           <a:lstStyle>
             <a:lvl1pPr marL="0" indent="0">
               <a:buNone/>
-              <a:defRPr sz="1400"/>
+              <a:defRPr sz="1866"/>
             </a:lvl1pPr>
-            <a:lvl2pPr marL="457200" indent="0">
+            <a:lvl2pPr marL="609608" indent="0">
+              <a:buNone/>
+              <a:defRPr sz="1601"/>
+            </a:lvl2pPr>
+            <a:lvl3pPr marL="1219215" indent="0">
+              <a:buNone/>
+              <a:defRPr sz="1334"/>
+            </a:lvl3pPr>
+            <a:lvl4pPr marL="1828823" indent="0">
               <a:buNone/>
               <a:defRPr sz="1200"/>
-            </a:lvl2pPr>
-            <a:lvl3pPr marL="914400" indent="0">
+            </a:lvl4pPr>
+            <a:lvl5pPr marL="2438430" indent="0">
               <a:buNone/>
-              <a:defRPr sz="1000"/>
-            </a:lvl3pPr>
-            <a:lvl4pPr marL="1371600" indent="0">
+              <a:defRPr sz="1200"/>
+            </a:lvl5pPr>
+            <a:lvl6pPr marL="3048038" indent="0">
               <a:buNone/>
-              <a:defRPr sz="900"/>
-            </a:lvl4pPr>
-            <a:lvl5pPr marL="1828800" indent="0">
+              <a:defRPr sz="1200"/>
+            </a:lvl6pPr>
+            <a:lvl7pPr marL="3657645" indent="0">
               <a:buNone/>
-              <a:defRPr sz="900"/>
-            </a:lvl5pPr>
-            <a:lvl6pPr marL="2286000" indent="0">
+              <a:defRPr sz="1200"/>
+            </a:lvl7pPr>
+            <a:lvl8pPr marL="4267254" indent="0">
               <a:buNone/>
-              <a:defRPr sz="900"/>
-            </a:lvl6pPr>
-            <a:lvl7pPr marL="2743200" indent="0">
+              <a:defRPr sz="1200"/>
+            </a:lvl8pPr>
+            <a:lvl9pPr marL="4876862" indent="0">
               <a:buNone/>
-              <a:defRPr sz="900"/>
-            </a:lvl7pPr>
-            <a:lvl8pPr marL="3200400" indent="0">
-              <a:buNone/>
-              <a:defRPr sz="900"/>
-            </a:lvl8pPr>
-            <a:lvl9pPr marL="3657600" indent="0">
-              <a:buNone/>
-              <a:defRPr sz="900"/>
+              <a:defRPr sz="1200"/>
             </a:lvl9pPr>
           </a:lstStyle>
           <a:p>
@@ -2826,15 +2826,15 @@
         </p:nvSpPr>
         <p:spPr>
           <a:xfrm>
-            <a:off x="6451600" y="15362238"/>
-            <a:ext cx="19751675" cy="1812925"/>
+            <a:off x="8602134" y="23043359"/>
+            <a:ext cx="26335566" cy="2719388"/>
           </a:xfrm>
         </p:spPr>
         <p:txBody>
           <a:bodyPr anchor="b"/>
           <a:lstStyle>
             <a:lvl1pPr algn="l">
-              <a:defRPr sz="2000" b="1"/>
+              <a:defRPr sz="2667" b="1"/>
             </a:lvl1pPr>
           </a:lstStyle>
           <a:p>
@@ -2857,8 +2857,8 @@
         </p:nvSpPr>
         <p:spPr>
           <a:xfrm>
-            <a:off x="6451600" y="1960563"/>
-            <a:ext cx="19751675" cy="13168312"/>
+            <a:off x="8602134" y="2940845"/>
+            <a:ext cx="26335566" cy="19752468"/>
           </a:xfrm>
         </p:spPr>
         <p:txBody>
@@ -2866,39 +2866,39 @@
           <a:lstStyle>
             <a:lvl1pPr marL="0" indent="0">
               <a:buNone/>
+              <a:defRPr sz="4266"/>
+            </a:lvl1pPr>
+            <a:lvl2pPr marL="609608" indent="0">
+              <a:buNone/>
+              <a:defRPr sz="3734"/>
+            </a:lvl2pPr>
+            <a:lvl3pPr marL="1219215" indent="0">
+              <a:buNone/>
               <a:defRPr sz="3200"/>
-            </a:lvl1pPr>
-            <a:lvl2pPr marL="457200" indent="0">
+            </a:lvl3pPr>
+            <a:lvl4pPr marL="1828823" indent="0">
               <a:buNone/>
-              <a:defRPr sz="2800"/>
-            </a:lvl2pPr>
-            <a:lvl3pPr marL="914400" indent="0">
+              <a:defRPr sz="2667"/>
+            </a:lvl4pPr>
+            <a:lvl5pPr marL="2438430" indent="0">
               <a:buNone/>
-              <a:defRPr sz="2400"/>
-            </a:lvl3pPr>
-            <a:lvl4pPr marL="1371600" indent="0">
+              <a:defRPr sz="2667"/>
+            </a:lvl5pPr>
+            <a:lvl6pPr marL="3048038" indent="0">
               <a:buNone/>
-              <a:defRPr sz="2000"/>
-            </a:lvl4pPr>
-            <a:lvl5pPr marL="1828800" indent="0">
+              <a:defRPr sz="2667"/>
+            </a:lvl6pPr>
+            <a:lvl7pPr marL="3657645" indent="0">
               <a:buNone/>
-              <a:defRPr sz="2000"/>
-            </a:lvl5pPr>
-            <a:lvl6pPr marL="2286000" indent="0">
+              <a:defRPr sz="2667"/>
+            </a:lvl7pPr>
+            <a:lvl8pPr marL="4267254" indent="0">
               <a:buNone/>
-              <a:defRPr sz="2000"/>
-            </a:lvl6pPr>
-            <a:lvl7pPr marL="2743200" indent="0">
+              <a:defRPr sz="2667"/>
+            </a:lvl8pPr>
+            <a:lvl9pPr marL="4876862" indent="0">
               <a:buNone/>
-              <a:defRPr sz="2000"/>
-            </a:lvl7pPr>
-            <a:lvl8pPr marL="3200400" indent="0">
-              <a:buNone/>
-              <a:defRPr sz="2000"/>
-            </a:lvl8pPr>
-            <a:lvl9pPr marL="3657600" indent="0">
-              <a:buNone/>
-              <a:defRPr sz="2000"/>
+              <a:defRPr sz="2667"/>
             </a:lvl9pPr>
           </a:lstStyle>
           <a:p>
@@ -2919,8 +2919,8 @@
         </p:nvSpPr>
         <p:spPr>
           <a:xfrm>
-            <a:off x="6451600" y="17175163"/>
-            <a:ext cx="19751675" cy="2576512"/>
+            <a:off x="8602134" y="25762745"/>
+            <a:ext cx="26335566" cy="3864768"/>
           </a:xfrm>
         </p:spPr>
         <p:txBody>
@@ -2928,39 +2928,39 @@
           <a:lstStyle>
             <a:lvl1pPr marL="0" indent="0">
               <a:buNone/>
-              <a:defRPr sz="1400"/>
+              <a:defRPr sz="1866"/>
             </a:lvl1pPr>
-            <a:lvl2pPr marL="457200" indent="0">
+            <a:lvl2pPr marL="609608" indent="0">
+              <a:buNone/>
+              <a:defRPr sz="1601"/>
+            </a:lvl2pPr>
+            <a:lvl3pPr marL="1219215" indent="0">
+              <a:buNone/>
+              <a:defRPr sz="1334"/>
+            </a:lvl3pPr>
+            <a:lvl4pPr marL="1828823" indent="0">
               <a:buNone/>
               <a:defRPr sz="1200"/>
-            </a:lvl2pPr>
-            <a:lvl3pPr marL="914400" indent="0">
+            </a:lvl4pPr>
+            <a:lvl5pPr marL="2438430" indent="0">
               <a:buNone/>
-              <a:defRPr sz="1000"/>
-            </a:lvl3pPr>
-            <a:lvl4pPr marL="1371600" indent="0">
+              <a:defRPr sz="1200"/>
+            </a:lvl5pPr>
+            <a:lvl6pPr marL="3048038" indent="0">
               <a:buNone/>
-              <a:defRPr sz="900"/>
-            </a:lvl4pPr>
-            <a:lvl5pPr marL="1828800" indent="0">
+              <a:defRPr sz="1200"/>
+            </a:lvl6pPr>
+            <a:lvl7pPr marL="3657645" indent="0">
               <a:buNone/>
-              <a:defRPr sz="900"/>
-            </a:lvl5pPr>
-            <a:lvl6pPr marL="2286000" indent="0">
+              <a:defRPr sz="1200"/>
+            </a:lvl7pPr>
+            <a:lvl8pPr marL="4267254" indent="0">
               <a:buNone/>
-              <a:defRPr sz="900"/>
-            </a:lvl6pPr>
-            <a:lvl7pPr marL="2743200" indent="0">
+              <a:defRPr sz="1200"/>
+            </a:lvl8pPr>
+            <a:lvl9pPr marL="4876862" indent="0">
               <a:buNone/>
-              <a:defRPr sz="900"/>
-            </a:lvl7pPr>
-            <a:lvl8pPr marL="3200400" indent="0">
-              <a:buNone/>
-              <a:defRPr sz="900"/>
-            </a:lvl8pPr>
-            <a:lvl9pPr marL="3657600" indent="0">
-              <a:buNone/>
-              <a:defRPr sz="900"/>
+              <a:defRPr sz="1200"/>
             </a:lvl9pPr>
           </a:lstStyle>
           <a:p>
@@ -3108,8 +3108,8 @@
         </p:nvSpPr>
         <p:spPr bwMode="auto">
           <a:xfrm>
-            <a:off x="1646238" y="879475"/>
-            <a:ext cx="29625925" cy="3657600"/>
+            <a:off x="2194985" y="1319213"/>
+            <a:ext cx="39501234" cy="5486400"/>
           </a:xfrm>
           <a:prstGeom prst="rect">
             <a:avLst/>
@@ -3150,8 +3150,8 @@
         </p:nvSpPr>
         <p:spPr bwMode="auto">
           <a:xfrm>
-            <a:off x="1646238" y="5121275"/>
-            <a:ext cx="29625925" cy="14482763"/>
+            <a:off x="2194985" y="7681915"/>
+            <a:ext cx="39501234" cy="21724145"/>
           </a:xfrm>
           <a:prstGeom prst="rect">
             <a:avLst/>
@@ -3220,8 +3220,8 @@
         </p:nvSpPr>
         <p:spPr bwMode="auto">
           <a:xfrm>
-            <a:off x="1646238" y="19985038"/>
-            <a:ext cx="7680325" cy="1524000"/>
+            <a:off x="2194985" y="29977557"/>
+            <a:ext cx="10240434" cy="2286000"/>
           </a:xfrm>
           <a:prstGeom prst="rect">
             <a:avLst/>
@@ -3246,7 +3246,7 @@
               <a:spcBef>
                 <a:spcPct val="0"/>
               </a:spcBef>
-              <a:defRPr sz="4800" b="0"/>
+              <a:defRPr sz="6401" b="0"/>
             </a:lvl1pPr>
           </a:lstStyle>
           <a:p>
@@ -3269,8 +3269,8 @@
         </p:nvSpPr>
         <p:spPr bwMode="auto">
           <a:xfrm>
-            <a:off x="11247438" y="19985038"/>
-            <a:ext cx="10423525" cy="1524000"/>
+            <a:off x="14996585" y="29977557"/>
+            <a:ext cx="13898034" cy="2286000"/>
           </a:xfrm>
           <a:prstGeom prst="rect">
             <a:avLst/>
@@ -3295,7 +3295,7 @@
               <a:spcBef>
                 <a:spcPct val="0"/>
               </a:spcBef>
-              <a:defRPr sz="4800" b="0"/>
+              <a:defRPr sz="6401" b="0"/>
             </a:lvl1pPr>
           </a:lstStyle>
           <a:p>
@@ -3318,8 +3318,8 @@
         </p:nvSpPr>
         <p:spPr bwMode="auto">
           <a:xfrm>
-            <a:off x="23591838" y="19985038"/>
-            <a:ext cx="7680325" cy="1524000"/>
+            <a:off x="31455785" y="29977557"/>
+            <a:ext cx="10240434" cy="2286000"/>
           </a:xfrm>
           <a:prstGeom prst="rect">
             <a:avLst/>
@@ -3344,7 +3344,7 @@
               <a:spcBef>
                 <a:spcPct val="0"/>
               </a:spcBef>
-              <a:defRPr sz="4800" b="0"/>
+              <a:defRPr sz="6401" b="0"/>
             </a:lvl1pPr>
           </a:lstStyle>
           <a:p>
@@ -3380,14 +3380,14 @@
   </p:sldLayoutIdLst>
   <p:txStyles>
     <p:titleStyle>
-      <a:lvl1pPr algn="ctr" defTabSz="3135313" rtl="0" eaLnBrk="0" fontAlgn="base" hangingPunct="0">
+      <a:lvl1pPr algn="ctr" defTabSz="4180470" rtl="0" eaLnBrk="0" fontAlgn="base" hangingPunct="0">
         <a:spcBef>
           <a:spcPct val="0"/>
         </a:spcBef>
         <a:spcAft>
           <a:spcPct val="0"/>
         </a:spcAft>
-        <a:defRPr sz="15100">
+        <a:defRPr sz="20133">
           <a:solidFill>
             <a:schemeClr val="tx2"/>
           </a:solidFill>
@@ -3396,14 +3396,14 @@
           <a:cs typeface="+mj-cs"/>
         </a:defRPr>
       </a:lvl1pPr>
-      <a:lvl2pPr algn="ctr" defTabSz="3135313" rtl="0" eaLnBrk="0" fontAlgn="base" hangingPunct="0">
+      <a:lvl2pPr algn="ctr" defTabSz="4180470" rtl="0" eaLnBrk="0" fontAlgn="base" hangingPunct="0">
         <a:spcBef>
           <a:spcPct val="0"/>
         </a:spcBef>
         <a:spcAft>
           <a:spcPct val="0"/>
         </a:spcAft>
-        <a:defRPr sz="15100">
+        <a:defRPr sz="20133">
           <a:solidFill>
             <a:schemeClr val="tx2"/>
           </a:solidFill>
@@ -3411,14 +3411,14 @@
           <a:cs typeface="Arial" charset="0"/>
         </a:defRPr>
       </a:lvl2pPr>
-      <a:lvl3pPr algn="ctr" defTabSz="3135313" rtl="0" eaLnBrk="0" fontAlgn="base" hangingPunct="0">
+      <a:lvl3pPr algn="ctr" defTabSz="4180470" rtl="0" eaLnBrk="0" fontAlgn="base" hangingPunct="0">
         <a:spcBef>
           <a:spcPct val="0"/>
         </a:spcBef>
         <a:spcAft>
           <a:spcPct val="0"/>
         </a:spcAft>
-        <a:defRPr sz="15100">
+        <a:defRPr sz="20133">
           <a:solidFill>
             <a:schemeClr val="tx2"/>
           </a:solidFill>
@@ -3426,14 +3426,14 @@
           <a:cs typeface="Arial" charset="0"/>
         </a:defRPr>
       </a:lvl3pPr>
-      <a:lvl4pPr algn="ctr" defTabSz="3135313" rtl="0" eaLnBrk="0" fontAlgn="base" hangingPunct="0">
+      <a:lvl4pPr algn="ctr" defTabSz="4180470" rtl="0" eaLnBrk="0" fontAlgn="base" hangingPunct="0">
         <a:spcBef>
           <a:spcPct val="0"/>
         </a:spcBef>
         <a:spcAft>
           <a:spcPct val="0"/>
         </a:spcAft>
-        <a:defRPr sz="15100">
+        <a:defRPr sz="20133">
           <a:solidFill>
             <a:schemeClr val="tx2"/>
           </a:solidFill>
@@ -3441,14 +3441,14 @@
           <a:cs typeface="Arial" charset="0"/>
         </a:defRPr>
       </a:lvl4pPr>
-      <a:lvl5pPr algn="ctr" defTabSz="3135313" rtl="0" eaLnBrk="0" fontAlgn="base" hangingPunct="0">
+      <a:lvl5pPr algn="ctr" defTabSz="4180470" rtl="0" eaLnBrk="0" fontAlgn="base" hangingPunct="0">
         <a:spcBef>
           <a:spcPct val="0"/>
         </a:spcBef>
         <a:spcAft>
           <a:spcPct val="0"/>
         </a:spcAft>
-        <a:defRPr sz="15100">
+        <a:defRPr sz="20133">
           <a:solidFill>
             <a:schemeClr val="tx2"/>
           </a:solidFill>
@@ -3456,14 +3456,14 @@
           <a:cs typeface="Arial" charset="0"/>
         </a:defRPr>
       </a:lvl5pPr>
-      <a:lvl6pPr marL="457200" algn="ctr" defTabSz="3135313" rtl="0" fontAlgn="base">
+      <a:lvl6pPr marL="609608" algn="ctr" defTabSz="4180470" rtl="0" fontAlgn="base">
         <a:spcBef>
           <a:spcPct val="0"/>
         </a:spcBef>
         <a:spcAft>
           <a:spcPct val="0"/>
         </a:spcAft>
-        <a:defRPr sz="15100">
+        <a:defRPr sz="20133">
           <a:solidFill>
             <a:schemeClr val="tx2"/>
           </a:solidFill>
@@ -3471,14 +3471,14 @@
           <a:cs typeface="Arial" charset="0"/>
         </a:defRPr>
       </a:lvl6pPr>
-      <a:lvl7pPr marL="914400" algn="ctr" defTabSz="3135313" rtl="0" fontAlgn="base">
+      <a:lvl7pPr marL="1219215" algn="ctr" defTabSz="4180470" rtl="0" fontAlgn="base">
         <a:spcBef>
           <a:spcPct val="0"/>
         </a:spcBef>
         <a:spcAft>
           <a:spcPct val="0"/>
         </a:spcAft>
-        <a:defRPr sz="15100">
+        <a:defRPr sz="20133">
           <a:solidFill>
             <a:schemeClr val="tx2"/>
           </a:solidFill>
@@ -3486,14 +3486,14 @@
           <a:cs typeface="Arial" charset="0"/>
         </a:defRPr>
       </a:lvl7pPr>
-      <a:lvl8pPr marL="1371600" algn="ctr" defTabSz="3135313" rtl="0" fontAlgn="base">
+      <a:lvl8pPr marL="1828823" algn="ctr" defTabSz="4180470" rtl="0" fontAlgn="base">
         <a:spcBef>
           <a:spcPct val="0"/>
         </a:spcBef>
         <a:spcAft>
           <a:spcPct val="0"/>
         </a:spcAft>
-        <a:defRPr sz="15100">
+        <a:defRPr sz="20133">
           <a:solidFill>
             <a:schemeClr val="tx2"/>
           </a:solidFill>
@@ -3501,14 +3501,14 @@
           <a:cs typeface="Arial" charset="0"/>
         </a:defRPr>
       </a:lvl8pPr>
-      <a:lvl9pPr marL="1828800" algn="ctr" defTabSz="3135313" rtl="0" fontAlgn="base">
+      <a:lvl9pPr marL="2438430" algn="ctr" defTabSz="4180470" rtl="0" fontAlgn="base">
         <a:spcBef>
           <a:spcPct val="0"/>
         </a:spcBef>
         <a:spcAft>
           <a:spcPct val="0"/>
         </a:spcAft>
-        <a:defRPr sz="15100">
+        <a:defRPr sz="20133">
           <a:solidFill>
             <a:schemeClr val="tx2"/>
           </a:solidFill>
@@ -3518,7 +3518,7 @@
       </a:lvl9pPr>
     </p:titleStyle>
     <p:bodyStyle>
-      <a:lvl1pPr marL="1176338" indent="-1176338" algn="l" defTabSz="3135313" rtl="0" eaLnBrk="0" fontAlgn="base" hangingPunct="0">
+      <a:lvl1pPr marL="1568471" indent="-1568471" algn="l" defTabSz="4180470" rtl="0" eaLnBrk="0" fontAlgn="base" hangingPunct="0">
         <a:spcBef>
           <a:spcPct val="20000"/>
         </a:spcBef>
@@ -3526,7 +3526,7 @@
           <a:spcPct val="0"/>
         </a:spcAft>
         <a:buChar char="•"/>
-        <a:defRPr sz="11100">
+        <a:defRPr sz="14801">
           <a:solidFill>
             <a:schemeClr val="tx1"/>
           </a:solidFill>
@@ -3535,7 +3535,7 @@
           <a:cs typeface="+mn-cs"/>
         </a:defRPr>
       </a:lvl1pPr>
-      <a:lvl2pPr marL="2547938" indent="-981075" algn="l" defTabSz="3135313" rtl="0" eaLnBrk="0" fontAlgn="base" hangingPunct="0">
+      <a:lvl2pPr marL="3397293" indent="-1308117" algn="l" defTabSz="4180470" rtl="0" eaLnBrk="0" fontAlgn="base" hangingPunct="0">
         <a:spcBef>
           <a:spcPct val="20000"/>
         </a:spcBef>
@@ -3543,7 +3543,7 @@
           <a:spcPct val="0"/>
         </a:spcAft>
         <a:buChar char="–"/>
-        <a:defRPr sz="9600">
+        <a:defRPr sz="12800">
           <a:solidFill>
             <a:schemeClr val="tx1"/>
           </a:solidFill>
@@ -3551,7 +3551,7 @@
           <a:cs typeface="+mn-cs"/>
         </a:defRPr>
       </a:lvl2pPr>
-      <a:lvl3pPr marL="3919538" indent="-784225" algn="l" defTabSz="3135313" rtl="0" eaLnBrk="0" fontAlgn="base" hangingPunct="0">
+      <a:lvl3pPr marL="5226116" indent="-1045647" algn="l" defTabSz="4180470" rtl="0" eaLnBrk="0" fontAlgn="base" hangingPunct="0">
         <a:spcBef>
           <a:spcPct val="20000"/>
         </a:spcBef>
@@ -3559,7 +3559,7 @@
           <a:spcPct val="0"/>
         </a:spcAft>
         <a:buChar char="•"/>
-        <a:defRPr sz="8200">
+        <a:defRPr sz="10934">
           <a:solidFill>
             <a:schemeClr val="tx1"/>
           </a:solidFill>
@@ -3567,7 +3567,7 @@
           <a:cs typeface="+mn-cs"/>
         </a:defRPr>
       </a:lvl3pPr>
-      <a:lvl4pPr marL="5486400" indent="-784225" algn="l" defTabSz="3135313" rtl="0" eaLnBrk="0" fontAlgn="base" hangingPunct="0">
+      <a:lvl4pPr marL="7315292" indent="-1045647" algn="l" defTabSz="4180470" rtl="0" eaLnBrk="0" fontAlgn="base" hangingPunct="0">
         <a:spcBef>
           <a:spcPct val="20000"/>
         </a:spcBef>
@@ -3575,7 +3575,7 @@
           <a:spcPct val="0"/>
         </a:spcAft>
         <a:buChar char="–"/>
-        <a:defRPr sz="6900">
+        <a:defRPr sz="9200">
           <a:solidFill>
             <a:schemeClr val="tx1"/>
           </a:solidFill>
@@ -3583,7 +3583,7 @@
           <a:cs typeface="+mn-cs"/>
         </a:defRPr>
       </a:lvl4pPr>
-      <a:lvl5pPr marL="7053263" indent="-782638" algn="l" defTabSz="3135313" rtl="0" eaLnBrk="0" fontAlgn="base" hangingPunct="0">
+      <a:lvl5pPr marL="9404468" indent="-1043531" algn="l" defTabSz="4180470" rtl="0" eaLnBrk="0" fontAlgn="base" hangingPunct="0">
         <a:spcBef>
           <a:spcPct val="20000"/>
         </a:spcBef>
@@ -3591,7 +3591,7 @@
           <a:spcPct val="0"/>
         </a:spcAft>
         <a:buChar char="»"/>
-        <a:defRPr sz="6900">
+        <a:defRPr sz="9200">
           <a:solidFill>
             <a:schemeClr val="tx1"/>
           </a:solidFill>
@@ -3599,7 +3599,7 @@
           <a:cs typeface="+mn-cs"/>
         </a:defRPr>
       </a:lvl5pPr>
-      <a:lvl6pPr marL="7510463" indent="-782638" algn="l" defTabSz="3135313" rtl="0" fontAlgn="base">
+      <a:lvl6pPr marL="10014077" indent="-1043531" algn="l" defTabSz="4180470" rtl="0" fontAlgn="base">
         <a:spcBef>
           <a:spcPct val="20000"/>
         </a:spcBef>
@@ -3607,7 +3607,7 @@
           <a:spcPct val="0"/>
         </a:spcAft>
         <a:buChar char="»"/>
-        <a:defRPr sz="6900">
+        <a:defRPr sz="9200">
           <a:solidFill>
             <a:schemeClr val="tx1"/>
           </a:solidFill>
@@ -3615,7 +3615,7 @@
           <a:cs typeface="+mn-cs"/>
         </a:defRPr>
       </a:lvl6pPr>
-      <a:lvl7pPr marL="7967663" indent="-782638" algn="l" defTabSz="3135313" rtl="0" fontAlgn="base">
+      <a:lvl7pPr marL="10623684" indent="-1043531" algn="l" defTabSz="4180470" rtl="0" fontAlgn="base">
         <a:spcBef>
           <a:spcPct val="20000"/>
         </a:spcBef>
@@ -3623,7 +3623,7 @@
           <a:spcPct val="0"/>
         </a:spcAft>
         <a:buChar char="»"/>
-        <a:defRPr sz="6900">
+        <a:defRPr sz="9200">
           <a:solidFill>
             <a:schemeClr val="tx1"/>
           </a:solidFill>
@@ -3631,7 +3631,7 @@
           <a:cs typeface="+mn-cs"/>
         </a:defRPr>
       </a:lvl7pPr>
-      <a:lvl8pPr marL="8424863" indent="-782638" algn="l" defTabSz="3135313" rtl="0" fontAlgn="base">
+      <a:lvl8pPr marL="11233292" indent="-1043531" algn="l" defTabSz="4180470" rtl="0" fontAlgn="base">
         <a:spcBef>
           <a:spcPct val="20000"/>
         </a:spcBef>
@@ -3639,7 +3639,7 @@
           <a:spcPct val="0"/>
         </a:spcAft>
         <a:buChar char="»"/>
-        <a:defRPr sz="6900">
+        <a:defRPr sz="9200">
           <a:solidFill>
             <a:schemeClr val="tx1"/>
           </a:solidFill>
@@ -3647,7 +3647,7 @@
           <a:cs typeface="+mn-cs"/>
         </a:defRPr>
       </a:lvl8pPr>
-      <a:lvl9pPr marL="8882063" indent="-782638" algn="l" defTabSz="3135313" rtl="0" fontAlgn="base">
+      <a:lvl9pPr marL="11842899" indent="-1043531" algn="l" defTabSz="4180470" rtl="0" fontAlgn="base">
         <a:spcBef>
           <a:spcPct val="20000"/>
         </a:spcBef>
@@ -3655,7 +3655,7 @@
           <a:spcPct val="0"/>
         </a:spcAft>
         <a:buChar char="»"/>
-        <a:defRPr sz="6900">
+        <a:defRPr sz="9200">
           <a:solidFill>
             <a:schemeClr val="tx1"/>
           </a:solidFill>
@@ -3668,8 +3668,8 @@
       <a:defPPr>
         <a:defRPr lang="en-US"/>
       </a:defPPr>
-      <a:lvl1pPr marL="0" algn="l" defTabSz="914400" rtl="0" eaLnBrk="1" latinLnBrk="0" hangingPunct="1">
-        <a:defRPr sz="1800" kern="1200">
+      <a:lvl1pPr marL="0" algn="l" defTabSz="1219215" rtl="0" eaLnBrk="1" latinLnBrk="0" hangingPunct="1">
+        <a:defRPr sz="2400" kern="1200">
           <a:solidFill>
             <a:schemeClr val="tx1"/>
           </a:solidFill>
@@ -3678,8 +3678,8 @@
           <a:cs typeface="+mn-cs"/>
         </a:defRPr>
       </a:lvl1pPr>
-      <a:lvl2pPr marL="457200" algn="l" defTabSz="914400" rtl="0" eaLnBrk="1" latinLnBrk="0" hangingPunct="1">
-        <a:defRPr sz="1800" kern="1200">
+      <a:lvl2pPr marL="609608" algn="l" defTabSz="1219215" rtl="0" eaLnBrk="1" latinLnBrk="0" hangingPunct="1">
+        <a:defRPr sz="2400" kern="1200">
           <a:solidFill>
             <a:schemeClr val="tx1"/>
           </a:solidFill>
@@ -3688,8 +3688,8 @@
           <a:cs typeface="+mn-cs"/>
         </a:defRPr>
       </a:lvl2pPr>
-      <a:lvl3pPr marL="914400" algn="l" defTabSz="914400" rtl="0" eaLnBrk="1" latinLnBrk="0" hangingPunct="1">
-        <a:defRPr sz="1800" kern="1200">
+      <a:lvl3pPr marL="1219215" algn="l" defTabSz="1219215" rtl="0" eaLnBrk="1" latinLnBrk="0" hangingPunct="1">
+        <a:defRPr sz="2400" kern="1200">
           <a:solidFill>
             <a:schemeClr val="tx1"/>
           </a:solidFill>
@@ -3698,8 +3698,8 @@
           <a:cs typeface="+mn-cs"/>
         </a:defRPr>
       </a:lvl3pPr>
-      <a:lvl4pPr marL="1371600" algn="l" defTabSz="914400" rtl="0" eaLnBrk="1" latinLnBrk="0" hangingPunct="1">
-        <a:defRPr sz="1800" kern="1200">
+      <a:lvl4pPr marL="1828823" algn="l" defTabSz="1219215" rtl="0" eaLnBrk="1" latinLnBrk="0" hangingPunct="1">
+        <a:defRPr sz="2400" kern="1200">
           <a:solidFill>
             <a:schemeClr val="tx1"/>
           </a:solidFill>
@@ -3708,8 +3708,8 @@
           <a:cs typeface="+mn-cs"/>
         </a:defRPr>
       </a:lvl4pPr>
-      <a:lvl5pPr marL="1828800" algn="l" defTabSz="914400" rtl="0" eaLnBrk="1" latinLnBrk="0" hangingPunct="1">
-        <a:defRPr sz="1800" kern="1200">
+      <a:lvl5pPr marL="2438430" algn="l" defTabSz="1219215" rtl="0" eaLnBrk="1" latinLnBrk="0" hangingPunct="1">
+        <a:defRPr sz="2400" kern="1200">
           <a:solidFill>
             <a:schemeClr val="tx1"/>
           </a:solidFill>
@@ -3718,8 +3718,8 @@
           <a:cs typeface="+mn-cs"/>
         </a:defRPr>
       </a:lvl5pPr>
-      <a:lvl6pPr marL="2286000" algn="l" defTabSz="914400" rtl="0" eaLnBrk="1" latinLnBrk="0" hangingPunct="1">
-        <a:defRPr sz="1800" kern="1200">
+      <a:lvl6pPr marL="3048038" algn="l" defTabSz="1219215" rtl="0" eaLnBrk="1" latinLnBrk="0" hangingPunct="1">
+        <a:defRPr sz="2400" kern="1200">
           <a:solidFill>
             <a:schemeClr val="tx1"/>
           </a:solidFill>
@@ -3728,8 +3728,8 @@
           <a:cs typeface="+mn-cs"/>
         </a:defRPr>
       </a:lvl6pPr>
-      <a:lvl7pPr marL="2743200" algn="l" defTabSz="914400" rtl="0" eaLnBrk="1" latinLnBrk="0" hangingPunct="1">
-        <a:defRPr sz="1800" kern="1200">
+      <a:lvl7pPr marL="3657645" algn="l" defTabSz="1219215" rtl="0" eaLnBrk="1" latinLnBrk="0" hangingPunct="1">
+        <a:defRPr sz="2400" kern="1200">
           <a:solidFill>
             <a:schemeClr val="tx1"/>
           </a:solidFill>
@@ -3738,8 +3738,8 @@
           <a:cs typeface="+mn-cs"/>
         </a:defRPr>
       </a:lvl7pPr>
-      <a:lvl8pPr marL="3200400" algn="l" defTabSz="914400" rtl="0" eaLnBrk="1" latinLnBrk="0" hangingPunct="1">
-        <a:defRPr sz="1800" kern="1200">
+      <a:lvl8pPr marL="4267254" algn="l" defTabSz="1219215" rtl="0" eaLnBrk="1" latinLnBrk="0" hangingPunct="1">
+        <a:defRPr sz="2400" kern="1200">
           <a:solidFill>
             <a:schemeClr val="tx1"/>
           </a:solidFill>
@@ -3748,8 +3748,8 @@
           <a:cs typeface="+mn-cs"/>
         </a:defRPr>
       </a:lvl8pPr>
-      <a:lvl9pPr marL="3657600" algn="l" defTabSz="914400" rtl="0" eaLnBrk="1" latinLnBrk="0" hangingPunct="1">
-        <a:defRPr sz="1800" kern="1200">
+      <a:lvl9pPr marL="4876862" algn="l" defTabSz="1219215" rtl="0" eaLnBrk="1" latinLnBrk="0" hangingPunct="1">
+        <a:defRPr sz="2400" kern="1200">
           <a:solidFill>
             <a:schemeClr val="tx1"/>
           </a:solidFill>
@@ -3790,8 +3790,8 @@
         </p:nvSpPr>
         <p:spPr bwMode="auto">
           <a:xfrm>
-            <a:off x="0" y="0"/>
-            <a:ext cx="32918400" cy="1849438"/>
+            <a:off x="261423" y="640597"/>
+            <a:ext cx="43891200" cy="2884187"/>
           </a:xfrm>
           <a:prstGeom prst="rect">
             <a:avLst/>
@@ -3805,35 +3805,35 @@
           </a:ln>
         </p:spPr>
         <p:txBody>
-          <a:bodyPr lIns="96250" tIns="48125" rIns="96250" bIns="48125">
+          <a:bodyPr lIns="128334" tIns="64167" rIns="128334" bIns="64167">
             <a:spAutoFit/>
           </a:bodyPr>
           <a:lstStyle/>
           <a:p>
-            <a:pPr defTabSz="3135313"/>
-            <a:r>
-              <a:rPr lang="en-US" sz="4600" dirty="0"/>
+            <a:pPr defTabSz="4180470"/>
+            <a:r>
+              <a:rPr lang="en-US" sz="8000" dirty="0"/>
               <a:t>ECE 362 Embedded Microcontroller Mini-Project </a:t>
             </a:r>
             <a:r>
-              <a:rPr lang="en-US" sz="4600" dirty="0">
+              <a:rPr lang="en-US" sz="8000" dirty="0">
                 <a:sym typeface="Symbol" pitchFamily="18" charset="2"/>
               </a:rPr>
               <a:t></a:t>
             </a:r>
             <a:r>
-              <a:rPr lang="en-US" sz="4600" dirty="0"/>
+              <a:rPr lang="en-US" sz="8000" dirty="0"/>
               <a:t> Fall 2016</a:t>
             </a:r>
           </a:p>
           <a:p>
-            <a:pPr defTabSz="3135313"/>
-            <a:r>
-              <a:rPr lang="en-US" sz="4600" dirty="0"/>
+            <a:pPr defTabSz="4180470"/>
+            <a:r>
+              <a:rPr lang="en-US" sz="6600" dirty="0"/>
               <a:t>Team</a:t>
             </a:r>
             <a:r>
-              <a:rPr lang="en-US" sz="4600" dirty="0">
+              <a:rPr lang="en-US" sz="6600" dirty="0">
                 <a:solidFill>
                   <a:srgbClr val="FF0000"/>
                 </a:solidFill>
@@ -3841,11 +3841,11 @@
               <a:t> 01 </a:t>
             </a:r>
             <a:r>
-              <a:rPr lang="en-US" sz="4600" dirty="0"/>
+              <a:rPr lang="en-US" sz="6600" dirty="0"/>
               <a:t>– </a:t>
             </a:r>
             <a:r>
-              <a:rPr lang="en-US" sz="4600" dirty="0">
+              <a:rPr lang="en-US" sz="6600" dirty="0">
                 <a:solidFill>
                   <a:srgbClr val="00B050"/>
                 </a:solidFill>
@@ -3872,8 +3872,8 @@
         </p:blipFill>
         <p:spPr bwMode="auto">
           <a:xfrm>
-            <a:off x="30880050" y="21218525"/>
-            <a:ext cx="2038350" cy="727075"/>
+            <a:off x="41158159" y="31744581"/>
+            <a:ext cx="2717801" cy="969434"/>
           </a:xfrm>
           <a:prstGeom prst="rect">
             <a:avLst/>
@@ -3897,8 +3897,8 @@
         </p:nvSpPr>
         <p:spPr bwMode="auto">
           <a:xfrm>
-            <a:off x="0" y="21180425"/>
-            <a:ext cx="3429000" cy="736600"/>
+            <a:off x="371617" y="31532394"/>
+            <a:ext cx="4572000" cy="991618"/>
           </a:xfrm>
           <a:prstGeom prst="rect">
             <a:avLst/>
@@ -3912,20 +3912,37 @@
           </a:ln>
         </p:spPr>
         <p:txBody>
-          <a:bodyPr lIns="96250" tIns="48125" rIns="96250" bIns="48125">
+          <a:bodyPr lIns="128334" tIns="64167" rIns="128334" bIns="64167">
             <a:spAutoFit/>
           </a:bodyPr>
           <a:lstStyle/>
           <a:p>
-            <a:pPr algn="l" defTabSz="3135313"/>
-            <a:r>
-              <a:rPr lang="en-US" sz="2100" b="0"/>
-              <a:t>Digijock(ette)-Strength Digital System Design</a:t>
-            </a:r>
-            <a:r>
-              <a:rPr lang="en-US" sz="2100" b="0" baseline="30000"/>
+            <a:pPr algn="l" defTabSz="4180470"/>
+            <a:r>
+              <a:rPr lang="en-US" sz="2801" b="0" dirty="0" err="1"/>
+              <a:t>Digijock</a:t>
+            </a:r>
+            <a:r>
+              <a:rPr lang="en-US" sz="2801" b="0" dirty="0"/>
+              <a:t>(</a:t>
+            </a:r>
+            <a:r>
+              <a:rPr lang="en-US" sz="2801" b="0" dirty="0" err="1"/>
+              <a:t>ette</a:t>
+            </a:r>
+            <a:r>
+              <a:rPr lang="en-US" sz="2801" b="0" dirty="0"/>
+              <a:t>)-Strength Digital System </a:t>
+            </a:r>
+            <a:r>
+              <a:rPr lang="en-US" sz="2801" b="0" dirty="0" err="1"/>
+              <a:t>Design</a:t>
+            </a:r>
+            <a:r>
+              <a:rPr lang="en-US" sz="2801" b="0" baseline="30000" dirty="0" err="1"/>
               <a:t>TM</a:t>
             </a:r>
+            <a:endParaRPr lang="en-US" sz="2801" b="0" baseline="30000" dirty="0"/>
           </a:p>
         </p:txBody>
       </p:sp>
@@ -3937,8 +3954,8 @@
         </p:nvSpPr>
         <p:spPr>
           <a:xfrm>
-            <a:off x="665822" y="3204801"/>
-            <a:ext cx="10668000" cy="3200876"/>
+            <a:off x="887764" y="6101870"/>
+            <a:ext cx="14224001" cy="4652684"/>
           </a:xfrm>
           <a:prstGeom prst="rect">
             <a:avLst/>
@@ -3957,13 +3974,13 @@
           <a:lstStyle/>
           <a:p>
             <a:r>
-              <a:rPr lang="en-US" sz="4000" dirty="0"/>
+              <a:rPr lang="en-US" sz="5334" dirty="0"/>
               <a:t>Overview</a:t>
             </a:r>
           </a:p>
           <a:p>
             <a:r>
-              <a:rPr lang="en-US" sz="3600" dirty="0"/>
+              <a:rPr lang="en-US" sz="5400" dirty="0"/>
               <a:t>Cruise control HUD aims to help drivers by dynamically displaying data about the car’s velocity, distance to oncoming cars, and whether to slow down or speed up.</a:t>
             </a:r>
           </a:p>
@@ -3977,8 +3994,8 @@
         </p:nvSpPr>
         <p:spPr bwMode="auto">
           <a:xfrm>
-            <a:off x="1632246" y="12980641"/>
-            <a:ext cx="721934" cy="688296"/>
+            <a:off x="2176328" y="19136322"/>
+            <a:ext cx="962579" cy="1138637"/>
           </a:xfrm>
           <a:prstGeom prst="downArrow">
             <a:avLst/>
@@ -3996,7 +4013,7 @@
           <a:effectLst/>
         </p:spPr>
         <p:txBody>
-          <a:bodyPr vert="horz" wrap="square" lIns="91440" tIns="45720" rIns="91440" bIns="45720" numCol="1" rtlCol="0" anchor="t" anchorCtr="0" compatLnSpc="1">
+          <a:bodyPr vert="horz" wrap="square" lIns="121920" tIns="60960" rIns="121920" bIns="60960" numCol="1" rtlCol="0" anchor="t" anchorCtr="0" compatLnSpc="1">
             <a:prstTxWarp prst="textNoShape">
               <a:avLst/>
             </a:prstTxWarp>
@@ -4004,33 +4021,8 @@
           </a:bodyPr>
           <a:lstStyle/>
           <a:p>
-            <a:pPr marL="0" marR="0" indent="0" algn="ctr" defTabSz="3135313" rtl="0" eaLnBrk="1" fontAlgn="base" latinLnBrk="0" hangingPunct="1">
-              <a:lnSpc>
-                <a:spcPct val="100000"/>
-              </a:lnSpc>
-              <a:spcBef>
-                <a:spcPct val="50000"/>
-              </a:spcBef>
-              <a:spcAft>
-                <a:spcPct val="0"/>
-              </a:spcAft>
-              <a:buClrTx/>
-              <a:buSzTx/>
-              <a:buFontTx/>
-              <a:buNone/>
-              <a:tabLst/>
-            </a:pPr>
-            <a:endParaRPr kumimoji="0" lang="en-US" sz="3800" b="1" i="0" u="none" strike="noStrike" cap="none" normalizeH="0" baseline="0">
-              <a:ln>
-                <a:noFill/>
-              </a:ln>
-              <a:solidFill>
-                <a:schemeClr val="tx1"/>
-              </a:solidFill>
-              <a:effectLst/>
-              <a:latin typeface="Arial" charset="0"/>
-              <a:cs typeface="Arial" charset="0"/>
-            </a:endParaRPr>
+            <a:pPr defTabSz="4180470"/>
+            <a:endParaRPr lang="en-US" sz="5067"/>
           </a:p>
         </p:txBody>
       </p:sp>
@@ -4042,8 +4034,8 @@
         </p:nvSpPr>
         <p:spPr>
           <a:xfrm>
-            <a:off x="677480" y="12104477"/>
-            <a:ext cx="2374947" cy="830997"/>
+            <a:off x="903308" y="17968103"/>
+            <a:ext cx="3166596" cy="1077346"/>
           </a:xfrm>
           <a:prstGeom prst="rect">
             <a:avLst/>
@@ -4057,7 +4049,7 @@
           <a:lstStyle/>
           <a:p>
             <a:r>
-              <a:rPr lang="en-US" sz="4800" dirty="0"/>
+              <a:rPr lang="en-US" sz="6401" dirty="0"/>
               <a:t>LIDAR</a:t>
             </a:r>
           </a:p>
@@ -4071,8 +4063,8 @@
         </p:nvSpPr>
         <p:spPr>
           <a:xfrm>
-            <a:off x="972278" y="13766441"/>
-            <a:ext cx="1957215" cy="830997"/>
+            <a:off x="1296371" y="20184056"/>
+            <a:ext cx="2609621" cy="1077346"/>
           </a:xfrm>
           <a:prstGeom prst="rect">
             <a:avLst/>
@@ -4086,7 +4078,7 @@
           <a:lstStyle/>
           <a:p>
             <a:r>
-              <a:rPr lang="en-US" sz="4800" dirty="0"/>
+              <a:rPr lang="en-US" sz="6401" dirty="0"/>
               <a:t>ATD</a:t>
             </a:r>
           </a:p>
@@ -4100,8 +4092,8 @@
         </p:nvSpPr>
         <p:spPr>
           <a:xfrm>
-            <a:off x="2952508" y="16100901"/>
-            <a:ext cx="1747260" cy="830997"/>
+            <a:off x="3936678" y="23296668"/>
+            <a:ext cx="2329680" cy="1077346"/>
           </a:xfrm>
           <a:prstGeom prst="rect">
             <a:avLst/>
@@ -4115,7 +4107,7 @@
           <a:lstStyle/>
           <a:p>
             <a:r>
-              <a:rPr lang="en-US" sz="4800" dirty="0"/>
+              <a:rPr lang="en-US" sz="6401" dirty="0"/>
               <a:t>SPI</a:t>
             </a:r>
           </a:p>
@@ -4129,8 +4121,8 @@
         </p:nvSpPr>
         <p:spPr>
           <a:xfrm>
-            <a:off x="1131702" y="16751295"/>
-            <a:ext cx="2256984" cy="830997"/>
+            <a:off x="1508936" y="24163860"/>
+            <a:ext cx="3009312" cy="1077346"/>
           </a:xfrm>
           <a:prstGeom prst="rect">
             <a:avLst/>
@@ -4144,7 +4136,7 @@
           <a:lstStyle/>
           <a:p>
             <a:r>
-              <a:rPr lang="en-US" sz="4800" dirty="0"/>
+              <a:rPr lang="en-US" sz="6401" dirty="0"/>
               <a:t>SCI</a:t>
             </a:r>
           </a:p>
@@ -4158,8 +4150,8 @@
         </p:nvSpPr>
         <p:spPr>
           <a:xfrm>
-            <a:off x="644281" y="18821136"/>
-            <a:ext cx="3764735" cy="1569660"/>
+            <a:off x="859043" y="26923649"/>
+            <a:ext cx="5019647" cy="2062359"/>
           </a:xfrm>
           <a:prstGeom prst="rect">
             <a:avLst/>
@@ -4173,7 +4165,7 @@
           <a:lstStyle/>
           <a:p>
             <a:r>
-              <a:rPr lang="en-US" sz="4800" dirty="0"/>
+              <a:rPr lang="en-US" sz="6401" dirty="0"/>
               <a:t>OBD-to-TTL converter</a:t>
             </a:r>
           </a:p>
@@ -4187,8 +4179,8 @@
         </p:nvSpPr>
         <p:spPr>
           <a:xfrm>
-            <a:off x="5317447" y="19213678"/>
-            <a:ext cx="3383129" cy="830997"/>
+            <a:off x="7089930" y="27447038"/>
+            <a:ext cx="4510839" cy="1077346"/>
           </a:xfrm>
           <a:prstGeom prst="rect">
             <a:avLst/>
@@ -4202,7 +4194,7 @@
           <a:lstStyle/>
           <a:p>
             <a:r>
-              <a:rPr lang="en-US" sz="4800" dirty="0"/>
+              <a:rPr lang="en-US" sz="6401" dirty="0"/>
               <a:t>OBD Port</a:t>
             </a:r>
           </a:p>
@@ -4216,8 +4208,8 @@
         </p:nvSpPr>
         <p:spPr>
           <a:xfrm>
-            <a:off x="5077648" y="16061617"/>
-            <a:ext cx="3317486" cy="1323439"/>
+            <a:off x="6770198" y="23244290"/>
+            <a:ext cx="4423314" cy="1734064"/>
           </a:xfrm>
           <a:prstGeom prst="rect">
             <a:avLst/>
@@ -4231,7 +4223,7 @@
           <a:lstStyle/>
           <a:p>
             <a:r>
-              <a:rPr lang="en-US" sz="4000" dirty="0"/>
+              <a:rPr lang="en-US" sz="5334" dirty="0"/>
               <a:t>Shift Registers</a:t>
             </a:r>
           </a:p>
@@ -4245,8 +4237,8 @@
         </p:nvSpPr>
         <p:spPr>
           <a:xfrm>
-            <a:off x="8166650" y="15887465"/>
-            <a:ext cx="4349650" cy="1323439"/>
+            <a:off x="10888866" y="23012087"/>
+            <a:ext cx="5799534" cy="1734064"/>
           </a:xfrm>
           <a:prstGeom prst="rect">
             <a:avLst/>
@@ -4260,7 +4252,7 @@
           <a:lstStyle/>
           <a:p>
             <a:r>
-              <a:rPr lang="en-US" sz="4000" dirty="0"/>
+              <a:rPr lang="en-US" sz="5334" dirty="0"/>
               <a:t>7 Segment Displays</a:t>
             </a:r>
           </a:p>
@@ -4274,8 +4266,8 @@
         </p:nvSpPr>
         <p:spPr bwMode="auto">
           <a:xfrm>
-            <a:off x="505282" y="13736855"/>
-            <a:ext cx="4145773" cy="3752958"/>
+            <a:off x="673710" y="20144607"/>
+            <a:ext cx="5592648" cy="5347271"/>
           </a:xfrm>
           <a:prstGeom prst="rect">
             <a:avLst/>
@@ -4293,7 +4285,7 @@
           <a:effectLst/>
         </p:spPr>
         <p:txBody>
-          <a:bodyPr vert="horz" wrap="square" lIns="91440" tIns="45720" rIns="91440" bIns="45720" numCol="1" rtlCol="0" anchor="t" anchorCtr="0" compatLnSpc="1">
+          <a:bodyPr vert="horz" wrap="square" lIns="121920" tIns="60960" rIns="121920" bIns="60960" numCol="1" rtlCol="0" anchor="t" anchorCtr="0" compatLnSpc="1">
             <a:prstTxWarp prst="textNoShape">
               <a:avLst/>
             </a:prstTxWarp>
@@ -4301,33 +4293,8 @@
           </a:bodyPr>
           <a:lstStyle/>
           <a:p>
-            <a:pPr marL="0" marR="0" indent="0" algn="ctr" defTabSz="3135313" rtl="0" eaLnBrk="1" fontAlgn="base" latinLnBrk="0" hangingPunct="1">
-              <a:lnSpc>
-                <a:spcPct val="100000"/>
-              </a:lnSpc>
-              <a:spcBef>
-                <a:spcPct val="50000"/>
-              </a:spcBef>
-              <a:spcAft>
-                <a:spcPct val="0"/>
-              </a:spcAft>
-              <a:buClrTx/>
-              <a:buSzTx/>
-              <a:buFontTx/>
-              <a:buNone/>
-              <a:tabLst/>
-            </a:pPr>
-            <a:endParaRPr kumimoji="0" lang="en-US" sz="3800" b="1" i="0" u="none" strike="noStrike" cap="none" normalizeH="0" baseline="0">
-              <a:ln>
-                <a:noFill/>
-              </a:ln>
-              <a:solidFill>
-                <a:schemeClr val="tx1"/>
-              </a:solidFill>
-              <a:effectLst/>
-              <a:latin typeface="Arial" charset="0"/>
-              <a:cs typeface="Arial" charset="0"/>
-            </a:endParaRPr>
+            <a:pPr defTabSz="4180470"/>
+            <a:endParaRPr lang="en-US" sz="5067"/>
           </a:p>
         </p:txBody>
       </p:sp>
@@ -4339,8 +4306,8 @@
         </p:nvSpPr>
         <p:spPr>
           <a:xfrm>
-            <a:off x="727963" y="15339617"/>
-            <a:ext cx="2052132" cy="830997"/>
+            <a:off x="970618" y="22281623"/>
+            <a:ext cx="2736176" cy="1077346"/>
           </a:xfrm>
           <a:prstGeom prst="rect">
             <a:avLst/>
@@ -4354,7 +4321,7 @@
           <a:lstStyle/>
           <a:p>
             <a:r>
-              <a:rPr lang="en-US" sz="4800" dirty="0"/>
+              <a:rPr lang="en-US" sz="6401" dirty="0"/>
               <a:t>9S12C</a:t>
             </a:r>
           </a:p>
@@ -4368,8 +4335,8 @@
         </p:nvSpPr>
         <p:spPr>
           <a:xfrm>
-            <a:off x="11707338" y="3449960"/>
-            <a:ext cx="9768568" cy="1754326"/>
+            <a:off x="15609783" y="6428747"/>
+            <a:ext cx="13024758" cy="2308324"/>
           </a:xfrm>
           <a:prstGeom prst="rect">
             <a:avLst/>
@@ -4388,7 +4355,7 @@
           <a:lstStyle/>
           <a:p>
             <a:r>
-              <a:rPr lang="en-US" sz="5400" dirty="0"/>
+              <a:rPr lang="en-US" sz="7200" dirty="0"/>
               <a:t>Team Members: Patrick May, Will Pierce, Tyler Carter</a:t>
             </a:r>
           </a:p>
@@ -4402,8 +4369,8 @@
         </p:nvSpPr>
         <p:spPr>
           <a:xfrm>
-            <a:off x="2725113" y="13969100"/>
-            <a:ext cx="2069991" cy="738664"/>
+            <a:off x="3633485" y="20454267"/>
+            <a:ext cx="2759988" cy="954107"/>
           </a:xfrm>
           <a:prstGeom prst="rect">
             <a:avLst/>
@@ -4417,7 +4384,7 @@
           <a:lstStyle/>
           <a:p>
             <a:r>
-              <a:rPr lang="en-US" sz="4200" dirty="0"/>
+              <a:rPr lang="en-US" sz="5600" dirty="0"/>
               <a:t>PWM</a:t>
             </a:r>
           </a:p>
@@ -4431,8 +4398,8 @@
         </p:nvSpPr>
         <p:spPr>
           <a:xfrm>
-            <a:off x="5323711" y="13819449"/>
-            <a:ext cx="4750701" cy="1446550"/>
+            <a:off x="7098283" y="20254733"/>
+            <a:ext cx="6334268" cy="1898084"/>
           </a:xfrm>
           <a:prstGeom prst="rect">
             <a:avLst/>
@@ -4446,14 +4413,14 @@
           <a:lstStyle/>
           <a:p>
             <a:r>
-              <a:rPr lang="en-US" sz="4400" dirty="0"/>
+              <a:rPr lang="en-US" sz="5867" dirty="0"/>
               <a:t>Speed up/</a:t>
             </a:r>
             <a:br>
-              <a:rPr lang="en-US" sz="4400" dirty="0"/>
+              <a:rPr lang="en-US" sz="5867" dirty="0"/>
             </a:br>
             <a:r>
-              <a:rPr lang="en-US" sz="4400" dirty="0"/>
+              <a:rPr lang="en-US" sz="5867" dirty="0"/>
               <a:t>Slow down LEDs</a:t>
             </a:r>
           </a:p>
@@ -4467,8 +4434,8 @@
         </p:nvSpPr>
         <p:spPr>
           <a:xfrm>
-            <a:off x="670220" y="6804809"/>
-            <a:ext cx="10663602" cy="4708981"/>
+            <a:off x="893627" y="10901879"/>
+            <a:ext cx="14218136" cy="6314677"/>
           </a:xfrm>
           <a:prstGeom prst="rect">
             <a:avLst/>
@@ -4487,13 +4454,13 @@
           <a:lstStyle/>
           <a:p>
             <a:r>
-              <a:rPr lang="en-US" sz="4000" dirty="0"/>
+              <a:rPr lang="en-US" sz="5334" dirty="0"/>
               <a:t>On-Chip Peripherals Detail</a:t>
             </a:r>
           </a:p>
           <a:p>
             <a:r>
-              <a:rPr lang="en-US" sz="4000" dirty="0"/>
+              <a:rPr lang="en-US" sz="5400" dirty="0"/>
               <a:t>This project uses the ATD to receive a PWM signal from the LIDAR, the TIM module to control LED refresh rates and LIDAR sampling, the SCI to communicate with the car, and the SPI module to drive 7-segments through a shift register.</a:t>
             </a:r>
           </a:p>
@@ -4507,8 +4474,8 @@
         </p:nvSpPr>
         <p:spPr bwMode="auto">
           <a:xfrm rot="16200000">
-            <a:off x="4806721" y="14047148"/>
-            <a:ext cx="721934" cy="688296"/>
+            <a:off x="6408962" y="20447878"/>
+            <a:ext cx="962579" cy="1138637"/>
           </a:xfrm>
           <a:prstGeom prst="downArrow">
             <a:avLst/>
@@ -4526,7 +4493,7 @@
           <a:effectLst/>
         </p:spPr>
         <p:txBody>
-          <a:bodyPr vert="horz" wrap="square" lIns="91440" tIns="45720" rIns="91440" bIns="45720" numCol="1" rtlCol="0" anchor="t" anchorCtr="0" compatLnSpc="1">
+          <a:bodyPr vert="horz" wrap="square" lIns="121920" tIns="60960" rIns="121920" bIns="60960" numCol="1" rtlCol="0" anchor="t" anchorCtr="0" compatLnSpc="1">
             <a:prstTxWarp prst="textNoShape">
               <a:avLst/>
             </a:prstTxWarp>
@@ -4534,33 +4501,8 @@
           </a:bodyPr>
           <a:lstStyle/>
           <a:p>
-            <a:pPr marL="0" marR="0" indent="0" algn="ctr" defTabSz="3135313" rtl="0" eaLnBrk="1" fontAlgn="base" latinLnBrk="0" hangingPunct="1">
-              <a:lnSpc>
-                <a:spcPct val="100000"/>
-              </a:lnSpc>
-              <a:spcBef>
-                <a:spcPct val="50000"/>
-              </a:spcBef>
-              <a:spcAft>
-                <a:spcPct val="0"/>
-              </a:spcAft>
-              <a:buClrTx/>
-              <a:buSzTx/>
-              <a:buFontTx/>
-              <a:buNone/>
-              <a:tabLst/>
-            </a:pPr>
-            <a:endParaRPr kumimoji="0" lang="en-US" sz="3800" b="1" i="0" u="none" strike="noStrike" cap="none" normalizeH="0" baseline="0">
-              <a:ln>
-                <a:noFill/>
-              </a:ln>
-              <a:solidFill>
-                <a:schemeClr val="tx1"/>
-              </a:solidFill>
-              <a:effectLst/>
-              <a:latin typeface="Arial" charset="0"/>
-              <a:cs typeface="Arial" charset="0"/>
-            </a:endParaRPr>
+            <a:pPr defTabSz="4180470"/>
+            <a:endParaRPr lang="en-US" sz="5067"/>
           </a:p>
         </p:txBody>
       </p:sp>
@@ -4572,8 +4514,8 @@
         </p:nvSpPr>
         <p:spPr bwMode="auto">
           <a:xfrm rot="16200000">
-            <a:off x="4848525" y="16172251"/>
-            <a:ext cx="721934" cy="688296"/>
+            <a:off x="6464701" y="23281348"/>
+            <a:ext cx="962579" cy="1138637"/>
           </a:xfrm>
           <a:prstGeom prst="downArrow">
             <a:avLst/>
@@ -4591,7 +4533,7 @@
           <a:effectLst/>
         </p:spPr>
         <p:txBody>
-          <a:bodyPr vert="horz" wrap="square" lIns="91440" tIns="45720" rIns="91440" bIns="45720" numCol="1" rtlCol="0" anchor="t" anchorCtr="0" compatLnSpc="1">
+          <a:bodyPr vert="horz" wrap="square" lIns="121920" tIns="60960" rIns="121920" bIns="60960" numCol="1" rtlCol="0" anchor="t" anchorCtr="0" compatLnSpc="1">
             <a:prstTxWarp prst="textNoShape">
               <a:avLst/>
             </a:prstTxWarp>
@@ -4599,33 +4541,8 @@
           </a:bodyPr>
           <a:lstStyle/>
           <a:p>
-            <a:pPr marL="0" marR="0" indent="0" algn="ctr" defTabSz="3135313" rtl="0" eaLnBrk="1" fontAlgn="base" latinLnBrk="0" hangingPunct="1">
-              <a:lnSpc>
-                <a:spcPct val="100000"/>
-              </a:lnSpc>
-              <a:spcBef>
-                <a:spcPct val="50000"/>
-              </a:spcBef>
-              <a:spcAft>
-                <a:spcPct val="0"/>
-              </a:spcAft>
-              <a:buClrTx/>
-              <a:buSzTx/>
-              <a:buFontTx/>
-              <a:buNone/>
-              <a:tabLst/>
-            </a:pPr>
-            <a:endParaRPr kumimoji="0" lang="en-US" sz="3800" b="1" i="0" u="none" strike="noStrike" cap="none" normalizeH="0" baseline="0">
-              <a:ln>
-                <a:noFill/>
-              </a:ln>
-              <a:solidFill>
-                <a:schemeClr val="tx1"/>
-              </a:solidFill>
-              <a:effectLst/>
-              <a:latin typeface="Arial" charset="0"/>
-              <a:cs typeface="Arial" charset="0"/>
-            </a:endParaRPr>
+            <a:pPr defTabSz="4180470"/>
+            <a:endParaRPr lang="en-US" sz="5067"/>
           </a:p>
         </p:txBody>
       </p:sp>
@@ -4637,8 +4554,8 @@
         </p:nvSpPr>
         <p:spPr bwMode="auto">
           <a:xfrm rot="16200000">
-            <a:off x="8149832" y="16172251"/>
-            <a:ext cx="721934" cy="688296"/>
+            <a:off x="10866443" y="23281348"/>
+            <a:ext cx="962579" cy="1138637"/>
           </a:xfrm>
           <a:prstGeom prst="downArrow">
             <a:avLst/>
@@ -4656,7 +4573,7 @@
           <a:effectLst/>
         </p:spPr>
         <p:txBody>
-          <a:bodyPr vert="horz" wrap="square" lIns="91440" tIns="45720" rIns="91440" bIns="45720" numCol="1" rtlCol="0" anchor="t" anchorCtr="0" compatLnSpc="1">
+          <a:bodyPr vert="horz" wrap="square" lIns="121920" tIns="60960" rIns="121920" bIns="60960" numCol="1" rtlCol="0" anchor="t" anchorCtr="0" compatLnSpc="1">
             <a:prstTxWarp prst="textNoShape">
               <a:avLst/>
             </a:prstTxWarp>
@@ -4664,33 +4581,8 @@
           </a:bodyPr>
           <a:lstStyle/>
           <a:p>
-            <a:pPr marL="0" marR="0" indent="0" algn="ctr" defTabSz="3135313" rtl="0" eaLnBrk="1" fontAlgn="base" latinLnBrk="0" hangingPunct="1">
-              <a:lnSpc>
-                <a:spcPct val="100000"/>
-              </a:lnSpc>
-              <a:spcBef>
-                <a:spcPct val="50000"/>
-              </a:spcBef>
-              <a:spcAft>
-                <a:spcPct val="0"/>
-              </a:spcAft>
-              <a:buClrTx/>
-              <a:buSzTx/>
-              <a:buFontTx/>
-              <a:buNone/>
-              <a:tabLst/>
-            </a:pPr>
-            <a:endParaRPr kumimoji="0" lang="en-US" sz="3800" b="1" i="0" u="none" strike="noStrike" cap="none" normalizeH="0" baseline="0">
-              <a:ln>
-                <a:noFill/>
-              </a:ln>
-              <a:solidFill>
-                <a:schemeClr val="tx1"/>
-              </a:solidFill>
-              <a:effectLst/>
-              <a:latin typeface="Arial" charset="0"/>
-              <a:cs typeface="Arial" charset="0"/>
-            </a:endParaRPr>
+            <a:pPr defTabSz="4180470"/>
+            <a:endParaRPr lang="en-US" sz="5067"/>
           </a:p>
         </p:txBody>
       </p:sp>
@@ -4702,8 +4594,8 @@
         </p:nvSpPr>
         <p:spPr bwMode="auto">
           <a:xfrm>
-            <a:off x="1173016" y="17987807"/>
-            <a:ext cx="721934" cy="688296"/>
+            <a:off x="1564022" y="25812543"/>
+            <a:ext cx="962579" cy="1138637"/>
           </a:xfrm>
           <a:prstGeom prst="downArrow">
             <a:avLst/>
@@ -4721,7 +4613,7 @@
           <a:effectLst/>
         </p:spPr>
         <p:txBody>
-          <a:bodyPr vert="horz" wrap="square" lIns="91440" tIns="45720" rIns="91440" bIns="45720" numCol="1" rtlCol="0" anchor="t" anchorCtr="0" compatLnSpc="1">
+          <a:bodyPr vert="horz" wrap="square" lIns="121920" tIns="60960" rIns="121920" bIns="60960" numCol="1" rtlCol="0" anchor="t" anchorCtr="0" compatLnSpc="1">
             <a:prstTxWarp prst="textNoShape">
               <a:avLst/>
             </a:prstTxWarp>
@@ -4729,33 +4621,8 @@
           </a:bodyPr>
           <a:lstStyle/>
           <a:p>
-            <a:pPr marL="0" marR="0" indent="0" algn="ctr" defTabSz="3135313" rtl="0" eaLnBrk="1" fontAlgn="base" latinLnBrk="0" hangingPunct="1">
-              <a:lnSpc>
-                <a:spcPct val="100000"/>
-              </a:lnSpc>
-              <a:spcBef>
-                <a:spcPct val="50000"/>
-              </a:spcBef>
-              <a:spcAft>
-                <a:spcPct val="0"/>
-              </a:spcAft>
-              <a:buClrTx/>
-              <a:buSzTx/>
-              <a:buFontTx/>
-              <a:buNone/>
-              <a:tabLst/>
-            </a:pPr>
-            <a:endParaRPr kumimoji="0" lang="en-US" sz="3800" b="1" i="0" u="none" strike="noStrike" cap="none" normalizeH="0" baseline="0">
-              <a:ln>
-                <a:noFill/>
-              </a:ln>
-              <a:solidFill>
-                <a:schemeClr val="tx1"/>
-              </a:solidFill>
-              <a:effectLst/>
-              <a:latin typeface="Arial" charset="0"/>
-              <a:cs typeface="Arial" charset="0"/>
-            </a:endParaRPr>
+            <a:pPr defTabSz="4180470"/>
+            <a:endParaRPr lang="en-US" sz="5067"/>
           </a:p>
         </p:txBody>
       </p:sp>
@@ -4767,8 +4634,8 @@
         </p:nvSpPr>
         <p:spPr bwMode="auto">
           <a:xfrm rot="10800000">
-            <a:off x="2260194" y="17872359"/>
-            <a:ext cx="721934" cy="688296"/>
+            <a:off x="3013592" y="25548160"/>
+            <a:ext cx="962579" cy="1138637"/>
           </a:xfrm>
           <a:prstGeom prst="downArrow">
             <a:avLst/>
@@ -4786,7 +4653,7 @@
           <a:effectLst/>
         </p:spPr>
         <p:txBody>
-          <a:bodyPr vert="horz" wrap="square" lIns="91440" tIns="45720" rIns="91440" bIns="45720" numCol="1" rtlCol="0" anchor="t" anchorCtr="0" compatLnSpc="1">
+          <a:bodyPr vert="horz" wrap="square" lIns="121920" tIns="60960" rIns="121920" bIns="60960" numCol="1" rtlCol="0" anchor="t" anchorCtr="0" compatLnSpc="1">
             <a:prstTxWarp prst="textNoShape">
               <a:avLst/>
             </a:prstTxWarp>
@@ -4794,33 +4661,8 @@
           </a:bodyPr>
           <a:lstStyle/>
           <a:p>
-            <a:pPr marL="0" marR="0" indent="0" algn="ctr" defTabSz="3135313" rtl="0" eaLnBrk="1" fontAlgn="base" latinLnBrk="0" hangingPunct="1">
-              <a:lnSpc>
-                <a:spcPct val="100000"/>
-              </a:lnSpc>
-              <a:spcBef>
-                <a:spcPct val="50000"/>
-              </a:spcBef>
-              <a:spcAft>
-                <a:spcPct val="0"/>
-              </a:spcAft>
-              <a:buClrTx/>
-              <a:buSzTx/>
-              <a:buFontTx/>
-              <a:buNone/>
-              <a:tabLst/>
-            </a:pPr>
-            <a:endParaRPr kumimoji="0" lang="en-US" sz="3800" b="1" i="0" u="none" strike="noStrike" cap="none" normalizeH="0" baseline="0">
-              <a:ln>
-                <a:noFill/>
-              </a:ln>
-              <a:solidFill>
-                <a:schemeClr val="tx1"/>
-              </a:solidFill>
-              <a:effectLst/>
-              <a:latin typeface="Arial" charset="0"/>
-              <a:cs typeface="Arial" charset="0"/>
-            </a:endParaRPr>
+            <a:pPr defTabSz="4180470"/>
+            <a:endParaRPr lang="en-US" sz="5067"/>
           </a:p>
         </p:txBody>
       </p:sp>
@@ -4832,8 +4674,8 @@
         </p:nvSpPr>
         <p:spPr bwMode="auto">
           <a:xfrm rot="16200000">
-            <a:off x="4590887" y="19700527"/>
-            <a:ext cx="721934" cy="688296"/>
+            <a:off x="6121184" y="27985717"/>
+            <a:ext cx="962579" cy="1138637"/>
           </a:xfrm>
           <a:prstGeom prst="downArrow">
             <a:avLst/>
@@ -4851,7 +4693,7 @@
           <a:effectLst/>
         </p:spPr>
         <p:txBody>
-          <a:bodyPr vert="horz" wrap="square" lIns="91440" tIns="45720" rIns="91440" bIns="45720" numCol="1" rtlCol="0" anchor="t" anchorCtr="0" compatLnSpc="1">
+          <a:bodyPr vert="horz" wrap="square" lIns="121920" tIns="60960" rIns="121920" bIns="60960" numCol="1" rtlCol="0" anchor="t" anchorCtr="0" compatLnSpc="1">
             <a:prstTxWarp prst="textNoShape">
               <a:avLst/>
             </a:prstTxWarp>
@@ -4859,33 +4701,8 @@
           </a:bodyPr>
           <a:lstStyle/>
           <a:p>
-            <a:pPr marL="0" marR="0" indent="0" algn="ctr" defTabSz="3135313" rtl="0" eaLnBrk="1" fontAlgn="base" latinLnBrk="0" hangingPunct="1">
-              <a:lnSpc>
-                <a:spcPct val="100000"/>
-              </a:lnSpc>
-              <a:spcBef>
-                <a:spcPct val="50000"/>
-              </a:spcBef>
-              <a:spcAft>
-                <a:spcPct val="0"/>
-              </a:spcAft>
-              <a:buClrTx/>
-              <a:buSzTx/>
-              <a:buFontTx/>
-              <a:buNone/>
-              <a:tabLst/>
-            </a:pPr>
-            <a:endParaRPr kumimoji="0" lang="en-US" sz="3800" b="1" i="0" u="none" strike="noStrike" cap="none" normalizeH="0" baseline="0">
-              <a:ln>
-                <a:noFill/>
-              </a:ln>
-              <a:solidFill>
-                <a:schemeClr val="tx1"/>
-              </a:solidFill>
-              <a:effectLst/>
-              <a:latin typeface="Arial" charset="0"/>
-              <a:cs typeface="Arial" charset="0"/>
-            </a:endParaRPr>
+            <a:pPr defTabSz="4180470"/>
+            <a:endParaRPr lang="en-US" sz="5067"/>
           </a:p>
         </p:txBody>
       </p:sp>
@@ -4911,8 +4728,8 @@
         </p:blipFill>
         <p:spPr>
           <a:xfrm>
-            <a:off x="17025146" y="10645616"/>
-            <a:ext cx="3536038" cy="3829132"/>
+            <a:off x="22788702" y="16671806"/>
+            <a:ext cx="4714718" cy="5105510"/>
           </a:xfrm>
           <a:prstGeom prst="rect">
             <a:avLst/>
@@ -4927,8 +4744,8 @@
         </p:nvSpPr>
         <p:spPr bwMode="auto">
           <a:xfrm rot="5400000">
-            <a:off x="4455697" y="18755728"/>
-            <a:ext cx="721934" cy="688296"/>
+            <a:off x="5940931" y="26725984"/>
+            <a:ext cx="962579" cy="1138637"/>
           </a:xfrm>
           <a:prstGeom prst="downArrow">
             <a:avLst/>
@@ -4946,7 +4763,7 @@
           <a:effectLst/>
         </p:spPr>
         <p:txBody>
-          <a:bodyPr vert="horz" wrap="square" lIns="91440" tIns="45720" rIns="91440" bIns="45720" numCol="1" rtlCol="0" anchor="t" anchorCtr="0" compatLnSpc="1">
+          <a:bodyPr vert="horz" wrap="square" lIns="121920" tIns="60960" rIns="121920" bIns="60960" numCol="1" rtlCol="0" anchor="t" anchorCtr="0" compatLnSpc="1">
             <a:prstTxWarp prst="textNoShape">
               <a:avLst/>
             </a:prstTxWarp>
@@ -4954,33 +4771,8 @@
           </a:bodyPr>
           <a:lstStyle/>
           <a:p>
-            <a:pPr marL="0" marR="0" indent="0" algn="ctr" defTabSz="3135313" rtl="0" eaLnBrk="1" fontAlgn="base" latinLnBrk="0" hangingPunct="1">
-              <a:lnSpc>
-                <a:spcPct val="100000"/>
-              </a:lnSpc>
-              <a:spcBef>
-                <a:spcPct val="50000"/>
-              </a:spcBef>
-              <a:spcAft>
-                <a:spcPct val="0"/>
-              </a:spcAft>
-              <a:buClrTx/>
-              <a:buSzTx/>
-              <a:buFontTx/>
-              <a:buNone/>
-              <a:tabLst/>
-            </a:pPr>
-            <a:endParaRPr kumimoji="0" lang="en-US" sz="3800" b="1" i="0" u="none" strike="noStrike" cap="none" normalizeH="0" baseline="0">
-              <a:ln>
-                <a:noFill/>
-              </a:ln>
-              <a:solidFill>
-                <a:schemeClr val="tx1"/>
-              </a:solidFill>
-              <a:effectLst/>
-              <a:latin typeface="Arial" charset="0"/>
-              <a:cs typeface="Arial" charset="0"/>
-            </a:endParaRPr>
+            <a:pPr defTabSz="4180470"/>
+            <a:endParaRPr lang="en-US" sz="5067"/>
           </a:p>
         </p:txBody>
       </p:sp>
@@ -4992,8 +4784,8 @@
         </p:nvSpPr>
         <p:spPr>
           <a:xfrm>
-            <a:off x="21849422" y="3204801"/>
-            <a:ext cx="10668000" cy="7078861"/>
+            <a:off x="29132563" y="6101868"/>
+            <a:ext cx="14224001" cy="9407832"/>
           </a:xfrm>
           <a:prstGeom prst="rect">
             <a:avLst/>
@@ -5012,13 +4804,13 @@
           <a:lstStyle/>
           <a:p>
             <a:r>
-              <a:rPr lang="en-US" sz="4000" dirty="0"/>
+              <a:rPr lang="en-US" sz="5334" dirty="0"/>
               <a:t>Implementation</a:t>
             </a:r>
           </a:p>
           <a:p>
             <a:r>
-              <a:rPr lang="en-US" sz="3600" dirty="0"/>
+              <a:rPr lang="en-US" sz="4800" dirty="0"/>
               <a:t>This project obtains its speed measurement by continuously polling a speed reading via SCI from the Engine Control Unit (ECU) of a car through the OBD port. Distance measurements are obtained by triggering a distance measurement on the LIDAR and then reading the value the LIDAR responds with using and ATD to calculate how long the pulse is and converting that to a distance. These inputs are then shifted out via SPI to external shift registers which drive 7-segment LEDs.</a:t>
             </a:r>
           </a:p>
@@ -5032,8 +4824,8 @@
         </p:nvSpPr>
         <p:spPr>
           <a:xfrm>
-            <a:off x="4743688" y="20646141"/>
-            <a:ext cx="3534084" cy="677108"/>
+            <a:off x="6324918" y="29356989"/>
+            <a:ext cx="4712112" cy="872098"/>
           </a:xfrm>
           <a:prstGeom prst="rect">
             <a:avLst/>
@@ -5047,7 +4839,7 @@
           <a:lstStyle/>
           <a:p>
             <a:r>
-              <a:rPr lang="en-US" dirty="0"/>
+              <a:rPr lang="en-US" sz="5067" dirty="0"/>
               <a:t>Power</a:t>
             </a:r>
           </a:p>
@@ -5061,8 +4853,8 @@
         </p:nvSpPr>
         <p:spPr bwMode="auto">
           <a:xfrm>
-            <a:off x="6204433" y="19957845"/>
-            <a:ext cx="448500" cy="688296"/>
+            <a:off x="8272577" y="28439261"/>
+            <a:ext cx="598001" cy="1051318"/>
           </a:xfrm>
           <a:prstGeom prst="downArrow">
             <a:avLst/>
@@ -5080,7 +4872,7 @@
           <a:effectLst/>
         </p:spPr>
         <p:txBody>
-          <a:bodyPr vert="horz" wrap="square" lIns="91440" tIns="45720" rIns="91440" bIns="45720" numCol="1" rtlCol="0" anchor="t" anchorCtr="0" compatLnSpc="1">
+          <a:bodyPr vert="horz" wrap="square" lIns="121920" tIns="60960" rIns="121920" bIns="60960" numCol="1" rtlCol="0" anchor="t" anchorCtr="0" compatLnSpc="1">
             <a:prstTxWarp prst="textNoShape">
               <a:avLst/>
             </a:prstTxWarp>
@@ -5088,33 +4880,8 @@
           </a:bodyPr>
           <a:lstStyle/>
           <a:p>
-            <a:pPr marL="0" marR="0" indent="0" algn="ctr" defTabSz="3135313" rtl="0" eaLnBrk="1" fontAlgn="base" latinLnBrk="0" hangingPunct="1">
-              <a:lnSpc>
-                <a:spcPct val="100000"/>
-              </a:lnSpc>
-              <a:spcBef>
-                <a:spcPct val="50000"/>
-              </a:spcBef>
-              <a:spcAft>
-                <a:spcPct val="0"/>
-              </a:spcAft>
-              <a:buClrTx/>
-              <a:buSzTx/>
-              <a:buFontTx/>
-              <a:buNone/>
-              <a:tabLst/>
-            </a:pPr>
-            <a:endParaRPr kumimoji="0" lang="en-US" sz="3800" b="1" i="0" u="none" strike="noStrike" cap="none" normalizeH="0" baseline="0">
-              <a:ln>
-                <a:noFill/>
-              </a:ln>
-              <a:solidFill>
-                <a:schemeClr val="tx1"/>
-              </a:solidFill>
-              <a:effectLst/>
-              <a:latin typeface="Arial" charset="0"/>
-              <a:cs typeface="Arial" charset="0"/>
-            </a:endParaRPr>
+            <a:pPr defTabSz="4180470"/>
+            <a:endParaRPr lang="en-US" sz="5067"/>
           </a:p>
         </p:txBody>
       </p:sp>
@@ -5126,8 +4893,8 @@
         </p:nvSpPr>
         <p:spPr bwMode="auto">
           <a:xfrm rot="16200000">
-            <a:off x="8847334" y="19711995"/>
-            <a:ext cx="721934" cy="688296"/>
+            <a:off x="11796446" y="28001008"/>
+            <a:ext cx="962579" cy="1138637"/>
           </a:xfrm>
           <a:prstGeom prst="downArrow">
             <a:avLst/>
@@ -5145,7 +4912,7 @@
           <a:effectLst/>
         </p:spPr>
         <p:txBody>
-          <a:bodyPr vert="horz" wrap="square" lIns="91440" tIns="45720" rIns="91440" bIns="45720" numCol="1" rtlCol="0" anchor="t" anchorCtr="0" compatLnSpc="1">
+          <a:bodyPr vert="horz" wrap="square" lIns="121920" tIns="60960" rIns="121920" bIns="60960" numCol="1" rtlCol="0" anchor="t" anchorCtr="0" compatLnSpc="1">
             <a:prstTxWarp prst="textNoShape">
               <a:avLst/>
             </a:prstTxWarp>
@@ -5153,33 +4920,8 @@
           </a:bodyPr>
           <a:lstStyle/>
           <a:p>
-            <a:pPr marL="0" marR="0" indent="0" algn="ctr" defTabSz="3135313" rtl="0" eaLnBrk="1" fontAlgn="base" latinLnBrk="0" hangingPunct="1">
-              <a:lnSpc>
-                <a:spcPct val="100000"/>
-              </a:lnSpc>
-              <a:spcBef>
-                <a:spcPct val="50000"/>
-              </a:spcBef>
-              <a:spcAft>
-                <a:spcPct val="0"/>
-              </a:spcAft>
-              <a:buClrTx/>
-              <a:buSzTx/>
-              <a:buFontTx/>
-              <a:buNone/>
-              <a:tabLst/>
-            </a:pPr>
-            <a:endParaRPr kumimoji="0" lang="en-US" sz="3800" b="1" i="0" u="none" strike="noStrike" cap="none" normalizeH="0" baseline="0">
-              <a:ln>
-                <a:noFill/>
-              </a:ln>
-              <a:solidFill>
-                <a:schemeClr val="tx1"/>
-              </a:solidFill>
-              <a:effectLst/>
-              <a:latin typeface="Arial" charset="0"/>
-              <a:cs typeface="Arial" charset="0"/>
-            </a:endParaRPr>
+            <a:pPr defTabSz="4180470"/>
+            <a:endParaRPr lang="en-US" sz="5067"/>
           </a:p>
         </p:txBody>
       </p:sp>
@@ -5191,8 +4933,8 @@
         </p:nvSpPr>
         <p:spPr bwMode="auto">
           <a:xfrm rot="5400000">
-            <a:off x="8712144" y="18767196"/>
-            <a:ext cx="721934" cy="688296"/>
+            <a:off x="11616193" y="26741275"/>
+            <a:ext cx="962579" cy="1138637"/>
           </a:xfrm>
           <a:prstGeom prst="downArrow">
             <a:avLst/>
@@ -5210,7 +4952,7 @@
           <a:effectLst/>
         </p:spPr>
         <p:txBody>
-          <a:bodyPr vert="horz" wrap="square" lIns="91440" tIns="45720" rIns="91440" bIns="45720" numCol="1" rtlCol="0" anchor="t" anchorCtr="0" compatLnSpc="1">
+          <a:bodyPr vert="horz" wrap="square" lIns="121920" tIns="60960" rIns="121920" bIns="60960" numCol="1" rtlCol="0" anchor="t" anchorCtr="0" compatLnSpc="1">
             <a:prstTxWarp prst="textNoShape">
               <a:avLst/>
             </a:prstTxWarp>
@@ -5218,33 +4960,8 @@
           </a:bodyPr>
           <a:lstStyle/>
           <a:p>
-            <a:pPr marL="0" marR="0" indent="0" algn="ctr" defTabSz="3135313" rtl="0" eaLnBrk="1" fontAlgn="base" latinLnBrk="0" hangingPunct="1">
-              <a:lnSpc>
-                <a:spcPct val="100000"/>
-              </a:lnSpc>
-              <a:spcBef>
-                <a:spcPct val="50000"/>
-              </a:spcBef>
-              <a:spcAft>
-                <a:spcPct val="0"/>
-              </a:spcAft>
-              <a:buClrTx/>
-              <a:buSzTx/>
-              <a:buFontTx/>
-              <a:buNone/>
-              <a:tabLst/>
-            </a:pPr>
-            <a:endParaRPr kumimoji="0" lang="en-US" sz="3800" b="1" i="0" u="none" strike="noStrike" cap="none" normalizeH="0" baseline="0">
-              <a:ln>
-                <a:noFill/>
-              </a:ln>
-              <a:solidFill>
-                <a:schemeClr val="tx1"/>
-              </a:solidFill>
-              <a:effectLst/>
-              <a:latin typeface="Arial" charset="0"/>
-              <a:cs typeface="Arial" charset="0"/>
-            </a:endParaRPr>
+            <a:pPr defTabSz="4180470"/>
+            <a:endParaRPr lang="en-US" sz="5067"/>
           </a:p>
         </p:txBody>
       </p:sp>
@@ -5256,8 +4973,8 @@
         </p:nvSpPr>
         <p:spPr>
           <a:xfrm>
-            <a:off x="9696994" y="19190467"/>
-            <a:ext cx="1306786" cy="830997"/>
+            <a:off x="12929325" y="27416090"/>
+            <a:ext cx="1742382" cy="1077346"/>
           </a:xfrm>
           <a:prstGeom prst="rect">
             <a:avLst/>
@@ -5271,7 +4988,7 @@
           <a:lstStyle/>
           <a:p>
             <a:r>
-              <a:rPr lang="en-US" sz="4800" dirty="0"/>
+              <a:rPr lang="en-US" sz="6401" dirty="0"/>
               <a:t>Car</a:t>
             </a:r>
           </a:p>
@@ -5299,8 +5016,8 @@
         </p:blipFill>
         <p:spPr>
           <a:xfrm>
-            <a:off x="12434015" y="10645616"/>
-            <a:ext cx="3648938" cy="3829132"/>
+            <a:off x="16667194" y="16671806"/>
+            <a:ext cx="4865250" cy="5105510"/>
           </a:xfrm>
           <a:prstGeom prst="rect">
             <a:avLst/>
@@ -5315,8 +5032,8 @@
         </p:nvSpPr>
         <p:spPr>
           <a:xfrm>
-            <a:off x="12173375" y="14748257"/>
-            <a:ext cx="4313136" cy="677108"/>
+            <a:off x="16319675" y="22141993"/>
+            <a:ext cx="5750849" cy="872098"/>
           </a:xfrm>
           <a:prstGeom prst="rect">
             <a:avLst/>
@@ -5330,7 +5047,7 @@
           <a:lstStyle/>
           <a:p>
             <a:r>
-              <a:rPr lang="en-US" dirty="0"/>
+              <a:rPr lang="en-US" sz="5067" dirty="0"/>
               <a:t>Circuit Schematic</a:t>
             </a:r>
           </a:p>
@@ -5344,8 +5061,8 @@
         </p:nvSpPr>
         <p:spPr>
           <a:xfrm>
-            <a:off x="17045928" y="14748257"/>
-            <a:ext cx="3329737" cy="677108"/>
+            <a:off x="22816413" y="22141993"/>
+            <a:ext cx="4439649" cy="872098"/>
           </a:xfrm>
           <a:prstGeom prst="rect">
             <a:avLst/>
@@ -5359,7 +5076,7 @@
           <a:lstStyle/>
           <a:p>
             <a:r>
-              <a:rPr lang="en-US" dirty="0"/>
+              <a:rPr lang="en-US" sz="5067" dirty="0"/>
               <a:t>Board layout</a:t>
             </a:r>
           </a:p>
@@ -5373,8 +5090,8 @@
         </p:nvSpPr>
         <p:spPr>
           <a:xfrm>
-            <a:off x="487195" y="1184726"/>
-            <a:ext cx="7661368" cy="677108"/>
+            <a:off x="649594" y="3408435"/>
+            <a:ext cx="10215158" cy="872098"/>
           </a:xfrm>
           <a:prstGeom prst="rect">
             <a:avLst/>
@@ -5388,12 +5105,12 @@
           <a:lstStyle/>
           <a:p>
             <a:r>
-              <a:rPr lang="en-US" dirty="0">
+              <a:rPr lang="en-US" sz="5067" dirty="0">
                 <a:hlinkClick r:id="rId5"/>
               </a:rPr>
               <a:t>https://youtu.be/xGuQt2sF4p8</a:t>
             </a:r>
-            <a:endParaRPr lang="en-US" dirty="0"/>
+            <a:endParaRPr lang="en-US" sz="5067" dirty="0"/>
           </a:p>
         </p:txBody>
       </p:sp>
@@ -5419,8 +5136,8 @@
         </p:blipFill>
         <p:spPr>
           <a:xfrm>
-            <a:off x="22179466" y="17385056"/>
-            <a:ext cx="4092362" cy="2802608"/>
+            <a:off x="36550023" y="26299492"/>
+            <a:ext cx="5456483" cy="3736811"/>
           </a:xfrm>
           <a:prstGeom prst="rect">
             <a:avLst/>
@@ -5435,8 +5152,8 @@
         </p:nvSpPr>
         <p:spPr>
           <a:xfrm>
-            <a:off x="11707339" y="15906338"/>
-            <a:ext cx="9768568" cy="5324535"/>
+            <a:off x="15609783" y="24131495"/>
+            <a:ext cx="13024758" cy="7145674"/>
           </a:xfrm>
           <a:prstGeom prst="rect">
             <a:avLst/>
@@ -5455,29 +5172,29 @@
           <a:lstStyle/>
           <a:p>
             <a:r>
-              <a:rPr lang="en-US" sz="4000" dirty="0"/>
+              <a:rPr lang="en-US" sz="5334" dirty="0"/>
               <a:t>Additional Design Work</a:t>
             </a:r>
           </a:p>
           <a:p>
             <a:r>
-              <a:rPr lang="en-US" sz="4000" dirty="0"/>
+              <a:rPr lang="en-US" sz="5400" dirty="0"/>
               <a:t>The PCB was created in Eagle and produced at </a:t>
             </a:r>
             <a:r>
-              <a:rPr lang="en-US" sz="4000" dirty="0" err="1"/>
+              <a:rPr lang="en-US" sz="5400" dirty="0" err="1"/>
               <a:t>OSHPark</a:t>
             </a:r>
             <a:r>
-              <a:rPr lang="en-US" sz="4000" dirty="0"/>
+              <a:rPr lang="en-US" sz="5400" dirty="0"/>
               <a:t>. 3D-printed enclosures for both the LIDAR and boards Autodesk Fusion and printed on a </a:t>
             </a:r>
             <a:r>
-              <a:rPr lang="en-US" sz="4000" dirty="0" err="1"/>
+              <a:rPr lang="en-US" sz="5400" dirty="0" err="1"/>
               <a:t>Printrbot</a:t>
             </a:r>
             <a:r>
-              <a:rPr lang="en-US" sz="4000" dirty="0"/>
+              <a:rPr lang="en-US" sz="5400" dirty="0"/>
               <a:t> Simple Metal. The LIDAR is attached to the hood of a car using neodymium magnets</a:t>
             </a:r>
           </a:p>
@@ -5491,8 +5208,8 @@
         </p:nvSpPr>
         <p:spPr>
           <a:xfrm>
-            <a:off x="21546905" y="20259805"/>
-            <a:ext cx="5286556" cy="1200329"/>
+            <a:off x="35753894" y="30036303"/>
+            <a:ext cx="7048742" cy="1569660"/>
           </a:xfrm>
           <a:prstGeom prst="rect">
             <a:avLst/>
@@ -5506,7 +5223,7 @@
           <a:lstStyle/>
           <a:p>
             <a:r>
-              <a:rPr lang="en-US" sz="3600" dirty="0"/>
+              <a:rPr lang="en-US" sz="4800" dirty="0"/>
               <a:t>LIDAR in its enclosure attached to a car</a:t>
             </a:r>
           </a:p>
@@ -5520,8 +5237,8 @@
         </p:nvSpPr>
         <p:spPr>
           <a:xfrm>
-            <a:off x="16758985" y="8778996"/>
-            <a:ext cx="4068359" cy="1754326"/>
+            <a:off x="22345315" y="13534128"/>
+            <a:ext cx="5424479" cy="2308324"/>
           </a:xfrm>
           <a:prstGeom prst="rect">
             <a:avLst/>
@@ -5535,10 +5252,10 @@
           <a:lstStyle/>
           <a:p>
             <a:r>
-              <a:rPr lang="en-US" sz="3600" dirty="0"/>
+              <a:rPr lang="en-US" sz="4800" dirty="0"/>
               <a:t>The displays reflecting off the windshield</a:t>
             </a:r>
-            <a:endParaRPr lang="en-US" dirty="0"/>
+            <a:endParaRPr lang="en-US" sz="5067" dirty="0"/>
           </a:p>
         </p:txBody>
       </p:sp>
@@ -5564,8 +5281,8 @@
         </p:blipFill>
         <p:spPr>
           <a:xfrm>
-            <a:off x="11732341" y="5910269"/>
-            <a:ext cx="4682353" cy="2834336"/>
+            <a:off x="15643122" y="9709158"/>
+            <a:ext cx="6243138" cy="3779115"/>
           </a:xfrm>
           <a:prstGeom prst="rect">
             <a:avLst/>
@@ -5580,8 +5297,8 @@
         </p:nvSpPr>
         <p:spPr>
           <a:xfrm>
-            <a:off x="11732342" y="8851523"/>
-            <a:ext cx="4757748" cy="646331"/>
+            <a:off x="15643124" y="13630832"/>
+            <a:ext cx="6343664" cy="830997"/>
           </a:xfrm>
           <a:prstGeom prst="rect">
             <a:avLst/>
@@ -5595,10 +5312,10 @@
           <a:lstStyle/>
           <a:p>
             <a:r>
-              <a:rPr lang="en-US" sz="3600" dirty="0"/>
+              <a:rPr lang="en-US" sz="4800" dirty="0"/>
               <a:t>Project in Operation</a:t>
             </a:r>
-            <a:endParaRPr lang="en-US" dirty="0"/>
+            <a:endParaRPr lang="en-US" sz="5067" dirty="0"/>
           </a:p>
         </p:txBody>
       </p:sp>
@@ -5610,8 +5327,8 @@
         </p:nvSpPr>
         <p:spPr>
           <a:xfrm>
-            <a:off x="6817162" y="1960110"/>
-            <a:ext cx="19676210" cy="769441"/>
+            <a:off x="9089550" y="4303964"/>
+            <a:ext cx="26234946" cy="995209"/>
           </a:xfrm>
           <a:prstGeom prst="rect">
             <a:avLst/>
@@ -5625,7 +5342,7 @@
           <a:lstStyle/>
           <a:p>
             <a:r>
-              <a:rPr lang="en-US" sz="4400" dirty="0"/>
+              <a:rPr lang="en-US" sz="5867" dirty="0"/>
               <a:t>“The HUD that will help your BFFAM improve his driving skills”</a:t>
             </a:r>
           </a:p>
@@ -5639,8 +5356,8 @@
         </p:nvSpPr>
         <p:spPr>
           <a:xfrm>
-            <a:off x="21849422" y="10574486"/>
-            <a:ext cx="10668000" cy="3477875"/>
+            <a:off x="29132563" y="15928115"/>
+            <a:ext cx="14224001" cy="4652684"/>
           </a:xfrm>
           <a:prstGeom prst="rect">
             <a:avLst/>
@@ -5659,29 +5376,29 @@
           <a:lstStyle/>
           <a:p>
             <a:r>
-              <a:rPr lang="en-US" sz="4000" dirty="0"/>
+              <a:rPr lang="en-US" sz="5334" dirty="0"/>
               <a:t>Additional Circuitry</a:t>
             </a:r>
           </a:p>
           <a:p>
             <a:r>
-              <a:rPr lang="en-US" sz="4000" dirty="0"/>
+              <a:rPr lang="en-US" sz="5400" dirty="0"/>
               <a:t>The main board interfaces to a MAX232 mounted on a </a:t>
             </a:r>
             <a:r>
-              <a:rPr lang="en-US" sz="4000" dirty="0" err="1"/>
+              <a:rPr lang="en-US" sz="5400" dirty="0" err="1"/>
               <a:t>perfboard</a:t>
             </a:r>
             <a:r>
-              <a:rPr lang="en-US" sz="4000" dirty="0"/>
+              <a:rPr lang="en-US" sz="5400" dirty="0"/>
               <a:t>. This is then interfaced to a </a:t>
             </a:r>
             <a:r>
-              <a:rPr lang="en-US" sz="4000" dirty="0" err="1"/>
+              <a:rPr lang="en-US" sz="5400" dirty="0" err="1"/>
               <a:t>Sparkfun</a:t>
             </a:r>
             <a:r>
-              <a:rPr lang="en-US" sz="4000" dirty="0"/>
+              <a:rPr lang="en-US" sz="5400" dirty="0"/>
               <a:t> OBD-to-UART board.</a:t>
             </a:r>
           </a:p>
@@ -5695,8 +5412,8 @@
         </p:nvSpPr>
         <p:spPr>
           <a:xfrm>
-            <a:off x="21849422" y="14290063"/>
-            <a:ext cx="10668000" cy="2930104"/>
+            <a:off x="29132563" y="20882218"/>
+            <a:ext cx="14224001" cy="4652684"/>
           </a:xfrm>
           <a:prstGeom prst="rect">
             <a:avLst/>
@@ -5715,14 +5432,14 @@
           <a:lstStyle/>
           <a:p>
             <a:r>
-              <a:rPr lang="en-US" sz="4000" dirty="0"/>
+              <a:rPr lang="en-US" sz="5334" dirty="0"/>
               <a:t>Future Work</a:t>
             </a:r>
           </a:p>
           <a:p>
             <a:r>
-              <a:rPr lang="en-US" sz="4000" dirty="0"/>
-              <a:t>Consolidating all circuitry to a single board and using solderless connectors to “foolproof” the design.</a:t>
+              <a:rPr lang="en-US" sz="5400" dirty="0"/>
+              <a:t>For future work, we consider consolidating all circuitry to a single board and using solderless connectors to “foolproof” the design.</a:t>
             </a:r>
           </a:p>
         </p:txBody>
@@ -5743,8 +5460,8 @@
         </p:blipFill>
         <p:spPr>
           <a:xfrm>
-            <a:off x="16834021" y="5950059"/>
-            <a:ext cx="4078932" cy="2828937"/>
+            <a:off x="22445362" y="9762214"/>
+            <a:ext cx="5438576" cy="3771917"/>
           </a:xfrm>
           <a:prstGeom prst="rect">
             <a:avLst/>
@@ -5773,14 +5490,44 @@
         </p:blipFill>
         <p:spPr>
           <a:xfrm>
-            <a:off x="27670354" y="17543194"/>
-            <a:ext cx="3774999" cy="3563476"/>
+            <a:off x="30127876" y="25967295"/>
+            <a:ext cx="5033333" cy="4751301"/>
           </a:xfrm>
           <a:prstGeom prst="rect">
             <a:avLst/>
           </a:prstGeom>
         </p:spPr>
       </p:pic>
+      <p:sp>
+        <p:nvSpPr>
+          <p:cNvPr id="14" name="TextBox 13"/>
+          <p:cNvSpPr txBox="1"/>
+          <p:nvPr/>
+        </p:nvSpPr>
+        <p:spPr>
+          <a:xfrm>
+            <a:off x="29354695" y="30923670"/>
+            <a:ext cx="6475174" cy="1569660"/>
+          </a:xfrm>
+          <a:prstGeom prst="rect">
+            <a:avLst/>
+          </a:prstGeom>
+          <a:noFill/>
+        </p:spPr>
+        <p:txBody>
+          <a:bodyPr wrap="square" rtlCol="0">
+            <a:spAutoFit/>
+          </a:bodyPr>
+          <a:lstStyle/>
+          <a:p>
+            <a:r>
+              <a:rPr lang="en-US" sz="4800" dirty="0"/>
+              <a:t>All boards inside enclosure</a:t>
+            </a:r>
+            <a:endParaRPr lang="en-US" dirty="0"/>
+          </a:p>
+        </p:txBody>
+      </p:sp>
     </p:spTree>
   </p:cSld>
   <p:clrMapOvr>

</xml_diff>

<commit_message>
documentation added by everyone, main.c documentation added
</commit_message>
<xml_diff>
--- a/Documentation/MP_poster.pptx
+++ b/Documentation/MP_poster.pptx
@@ -5153,7 +5153,7 @@
         <p:spPr>
           <a:xfrm>
             <a:off x="15609783" y="24131495"/>
-            <a:ext cx="13024758" cy="7145674"/>
+            <a:ext cx="13024758" cy="7976671"/>
           </a:xfrm>
           <a:prstGeom prst="rect">
             <a:avLst/>
@@ -5187,7 +5187,15 @@
             </a:r>
             <a:r>
               <a:rPr lang="en-US" sz="5400" dirty="0"/>
-              <a:t>. 3D-printed enclosures for both the LIDAR and boards Autodesk Fusion and printed on a </a:t>
+              <a:t>. 3D-printed enclosures for both the LIDAR and boards were </a:t>
+            </a:r>
+            <a:r>
+              <a:rPr lang="en-US" sz="5400"/>
+              <a:t>designed using </a:t>
+            </a:r>
+            <a:r>
+              <a:rPr lang="en-US" sz="5400" dirty="0"/>
+              <a:t>Autodesk Fusion and printed on a </a:t>
             </a:r>
             <a:r>
               <a:rPr lang="en-US" sz="5400" dirty="0" err="1"/>

</xml_diff>